<commit_message>
chore: presentation, added more hog details
</commit_message>
<xml_diff>
--- a/docs/group_project_presentation.pptx
+++ b/docs/group_project_presentation.pptx
@@ -5,7 +5,7 @@
     <p:sldMasterId id="2147483648" r:id="rId1"/>
   </p:sldMasterIdLst>
   <p:notesMasterIdLst>
-    <p:notesMasterId r:id="rId11"/>
+    <p:notesMasterId r:id="rId12"/>
   </p:notesMasterIdLst>
   <p:sldIdLst>
     <p:sldId id="256" r:id="rId2"/>
@@ -13,10 +13,11 @@
     <p:sldId id="259" r:id="rId4"/>
     <p:sldId id="263" r:id="rId5"/>
     <p:sldId id="258" r:id="rId6"/>
-    <p:sldId id="260" r:id="rId7"/>
-    <p:sldId id="262" r:id="rId8"/>
-    <p:sldId id="261" r:id="rId9"/>
-    <p:sldId id="265" r:id="rId10"/>
+    <p:sldId id="266" r:id="rId7"/>
+    <p:sldId id="260" r:id="rId8"/>
+    <p:sldId id="262" r:id="rId9"/>
+    <p:sldId id="261" r:id="rId10"/>
+    <p:sldId id="265" r:id="rId11"/>
   </p:sldIdLst>
   <p:sldSz cx="12192000" cy="6858000"/>
   <p:notesSz cx="6858000" cy="9144000"/>
@@ -115,6 +116,11 @@
       </a:defRPr>
     </a:lvl9pPr>
   </p:defaultTextStyle>
+  <p:extLst>
+    <p:ext uri="{EFAFB233-063F-42B5-8137-9DF3F51BA10A}">
+      <p15:sldGuideLst xmlns:p15="http://schemas.microsoft.com/office/powerpoint/2012/main"/>
+    </p:ext>
+  </p:extLst>
 </p:presentation>
 </file>
 
@@ -4083,6 +4089,351 @@
 </p:sld>
 </file>
 
+<file path=ppt/slides/slide10.xml><?xml version="1.0" encoding="utf-8"?>
+<p:sld xmlns:a="http://schemas.openxmlformats.org/drawingml/2006/main" xmlns:r="http://schemas.openxmlformats.org/officeDocument/2006/relationships" xmlns:p="http://schemas.openxmlformats.org/presentationml/2006/main">
+  <p:cSld>
+    <p:spTree>
+      <p:nvGrpSpPr>
+        <p:cNvPr id="1" name=""/>
+        <p:cNvGrpSpPr/>
+        <p:nvPr/>
+      </p:nvGrpSpPr>
+      <p:grpSpPr>
+        <a:xfrm>
+          <a:off x="0" y="0"/>
+          <a:ext cx="0" cy="0"/>
+          <a:chOff x="0" y="0"/>
+          <a:chExt cx="0" cy="0"/>
+        </a:xfrm>
+      </p:grpSpPr>
+      <p:sp>
+        <p:nvSpPr>
+          <p:cNvPr id="2" name="Titel 1">
+            <a:extLst>
+              <a:ext uri="{FF2B5EF4-FFF2-40B4-BE49-F238E27FC236}">
+                <a16:creationId xmlns:a16="http://schemas.microsoft.com/office/drawing/2014/main" id="{7EAC4DB8-0274-D840-CA37-9FA1C57E109D}"/>
+              </a:ext>
+            </a:extLst>
+          </p:cNvPr>
+          <p:cNvSpPr>
+            <a:spLocks noGrp="1"/>
+          </p:cNvSpPr>
+          <p:nvPr>
+            <p:ph type="title"/>
+          </p:nvPr>
+        </p:nvSpPr>
+        <p:spPr>
+          <a:xfrm>
+            <a:off x="7644582" y="505618"/>
+            <a:ext cx="2580969" cy="1325563"/>
+          </a:xfrm>
+        </p:spPr>
+        <p:txBody>
+          <a:bodyPr/>
+          <a:lstStyle/>
+          <a:p>
+            <a:r>
+              <a:rPr lang="de-DE" dirty="0"/>
+              <a:t>CNN</a:t>
+            </a:r>
+          </a:p>
+        </p:txBody>
+      </p:sp>
+      <p:sp>
+        <p:nvSpPr>
+          <p:cNvPr id="6" name="Inhaltsplatzhalter 5">
+            <a:extLst>
+              <a:ext uri="{FF2B5EF4-FFF2-40B4-BE49-F238E27FC236}">
+                <a16:creationId xmlns:a16="http://schemas.microsoft.com/office/drawing/2014/main" id="{E3857153-118B-52BE-2C3E-D127FAAE4CB2}"/>
+              </a:ext>
+            </a:extLst>
+          </p:cNvPr>
+          <p:cNvSpPr>
+            <a:spLocks noGrp="1"/>
+          </p:cNvSpPr>
+          <p:nvPr>
+            <p:ph idx="1"/>
+          </p:nvPr>
+        </p:nvSpPr>
+        <p:spPr>
+          <a:xfrm>
+            <a:off x="6933600" y="2747563"/>
+            <a:ext cx="8603400" cy="4351338"/>
+          </a:xfrm>
+        </p:spPr>
+        <p:txBody>
+          <a:bodyPr/>
+          <a:lstStyle/>
+          <a:p>
+            <a:r>
+              <a:rPr lang="en-US" dirty="0"/>
+              <a:t>keep right - 0.97</a:t>
+            </a:r>
+          </a:p>
+          <a:p>
+            <a:endParaRPr lang="en-US" dirty="0"/>
+          </a:p>
+          <a:p>
+            <a:r>
+              <a:rPr lang="en-US" dirty="0"/>
+              <a:t>no entry - 0.99</a:t>
+            </a:r>
+          </a:p>
+          <a:p>
+            <a:pPr lvl="1"/>
+            <a:endParaRPr lang="en-US" dirty="0"/>
+          </a:p>
+          <a:p>
+            <a:r>
+              <a:rPr lang="en-US" dirty="0"/>
+              <a:t>speed limit 70 - 0.99</a:t>
+            </a:r>
+          </a:p>
+          <a:p>
+            <a:endParaRPr lang="en-US" dirty="0"/>
+          </a:p>
+          <a:p>
+            <a:r>
+              <a:rPr lang="en-US" dirty="0"/>
+              <a:t>speed limit 70 - 0.99</a:t>
+            </a:r>
+            <a:endParaRPr lang="de-DE" dirty="0"/>
+          </a:p>
+        </p:txBody>
+      </p:sp>
+      <p:pic>
+        <p:nvPicPr>
+          <p:cNvPr id="9" name="Grafik 8">
+            <a:extLst>
+              <a:ext uri="{FF2B5EF4-FFF2-40B4-BE49-F238E27FC236}">
+                <a16:creationId xmlns:a16="http://schemas.microsoft.com/office/drawing/2014/main" id="{316BC47F-57E6-758B-5FA1-4B2D6C2D569E}"/>
+              </a:ext>
+            </a:extLst>
+          </p:cNvPr>
+          <p:cNvPicPr>
+            <a:picLocks noChangeAspect="1"/>
+          </p:cNvPicPr>
+          <p:nvPr/>
+        </p:nvPicPr>
+        <p:blipFill>
+          <a:blip r:embed="rId2"/>
+          <a:stretch>
+            <a:fillRect/>
+          </a:stretch>
+        </p:blipFill>
+        <p:spPr>
+          <a:xfrm>
+            <a:off x="785137" y="1168400"/>
+            <a:ext cx="1304925" cy="5324475"/>
+          </a:xfrm>
+          <a:prstGeom prst="rect">
+            <a:avLst/>
+          </a:prstGeom>
+        </p:spPr>
+      </p:pic>
+      <p:pic>
+        <p:nvPicPr>
+          <p:cNvPr id="11" name="Grafik 10">
+            <a:extLst>
+              <a:ext uri="{FF2B5EF4-FFF2-40B4-BE49-F238E27FC236}">
+                <a16:creationId xmlns:a16="http://schemas.microsoft.com/office/drawing/2014/main" id="{F394525A-FB46-4C64-7E0A-D1CC2F763165}"/>
+              </a:ext>
+            </a:extLst>
+          </p:cNvPr>
+          <p:cNvPicPr>
+            <a:picLocks noChangeAspect="1"/>
+          </p:cNvPicPr>
+          <p:nvPr/>
+        </p:nvPicPr>
+        <p:blipFill>
+          <a:blip r:embed="rId3"/>
+          <a:stretch>
+            <a:fillRect/>
+          </a:stretch>
+        </p:blipFill>
+        <p:spPr>
+          <a:xfrm>
+            <a:off x="10429800" y="1342426"/>
+            <a:ext cx="1066800" cy="5324475"/>
+          </a:xfrm>
+          <a:prstGeom prst="rect">
+            <a:avLst/>
+          </a:prstGeom>
+        </p:spPr>
+      </p:pic>
+      <p:sp>
+        <p:nvSpPr>
+          <p:cNvPr id="12" name="Textfeld 11">
+            <a:extLst>
+              <a:ext uri="{FF2B5EF4-FFF2-40B4-BE49-F238E27FC236}">
+                <a16:creationId xmlns:a16="http://schemas.microsoft.com/office/drawing/2014/main" id="{7C04BD8E-4037-B686-6A41-18723423633D}"/>
+              </a:ext>
+            </a:extLst>
+          </p:cNvPr>
+          <p:cNvSpPr txBox="1"/>
+          <p:nvPr/>
+        </p:nvSpPr>
+        <p:spPr>
+          <a:xfrm>
+            <a:off x="2109617" y="2747563"/>
+            <a:ext cx="3107967" cy="3539430"/>
+          </a:xfrm>
+          <a:prstGeom prst="rect">
+            <a:avLst/>
+          </a:prstGeom>
+          <a:noFill/>
+        </p:spPr>
+        <p:txBody>
+          <a:bodyPr wrap="none" rtlCol="0">
+            <a:spAutoFit/>
+          </a:bodyPr>
+          <a:lstStyle/>
+          <a:p>
+            <a:pPr marL="457200" indent="-457200">
+              <a:buFont typeface="Arial" panose="020B0604020202020204" pitchFamily="34" charset="0"/>
+              <a:buChar char="•"/>
+            </a:pPr>
+            <a:r>
+              <a:rPr lang="en-US" sz="2800" dirty="0"/>
+              <a:t>mandatory</a:t>
+            </a:r>
+          </a:p>
+          <a:p>
+            <a:pPr marL="457200" indent="-457200">
+              <a:buFont typeface="Arial" panose="020B0604020202020204" pitchFamily="34" charset="0"/>
+              <a:buChar char="•"/>
+            </a:pPr>
+            <a:r>
+              <a:rPr lang="en-US" sz="2800" dirty="0"/>
+              <a:t>keep right - 0.87</a:t>
+            </a:r>
+          </a:p>
+          <a:p>
+            <a:pPr marL="457200" indent="-457200">
+              <a:buFont typeface="Arial" panose="020B0604020202020204" pitchFamily="34" charset="0"/>
+              <a:buChar char="•"/>
+            </a:pPr>
+            <a:endParaRPr lang="en-US" sz="2800" dirty="0"/>
+          </a:p>
+          <a:p>
+            <a:pPr marL="457200" indent="-457200">
+              <a:buFont typeface="Arial" panose="020B0604020202020204" pitchFamily="34" charset="0"/>
+              <a:buChar char="•"/>
+            </a:pPr>
+            <a:r>
+              <a:rPr lang="en-US" sz="2800" dirty="0" err="1"/>
+              <a:t>no_entry</a:t>
+            </a:r>
+            <a:endParaRPr lang="en-US" sz="2800" dirty="0"/>
+          </a:p>
+          <a:p>
+            <a:pPr marL="457200" indent="-457200">
+              <a:buFont typeface="Arial" panose="020B0604020202020204" pitchFamily="34" charset="0"/>
+              <a:buChar char="•"/>
+            </a:pPr>
+            <a:r>
+              <a:rPr lang="en-US" sz="2800" dirty="0"/>
+              <a:t>no entry - 0.98</a:t>
+            </a:r>
+          </a:p>
+          <a:p>
+            <a:pPr marL="457200" indent="-457200">
+              <a:buFont typeface="Arial" panose="020B0604020202020204" pitchFamily="34" charset="0"/>
+              <a:buChar char="•"/>
+            </a:pPr>
+            <a:endParaRPr lang="en-US" sz="2800" dirty="0"/>
+          </a:p>
+          <a:p>
+            <a:pPr marL="457200" indent="-457200">
+              <a:buFont typeface="Arial" panose="020B0604020202020204" pitchFamily="34" charset="0"/>
+              <a:buChar char="•"/>
+            </a:pPr>
+            <a:r>
+              <a:rPr lang="en-US" sz="2800" dirty="0"/>
+              <a:t>prohibitory</a:t>
+            </a:r>
+          </a:p>
+          <a:p>
+            <a:pPr marL="457200" indent="-457200">
+              <a:buFont typeface="Arial" panose="020B0604020202020204" pitchFamily="34" charset="0"/>
+              <a:buChar char="•"/>
+            </a:pPr>
+            <a:r>
+              <a:rPr lang="en-US" sz="2800" dirty="0"/>
+              <a:t>keep right - 0.87</a:t>
+            </a:r>
+            <a:endParaRPr lang="de-DE" sz="2800" dirty="0"/>
+          </a:p>
+        </p:txBody>
+      </p:sp>
+      <p:sp>
+        <p:nvSpPr>
+          <p:cNvPr id="13" name="Titel 1">
+            <a:extLst>
+              <a:ext uri="{FF2B5EF4-FFF2-40B4-BE49-F238E27FC236}">
+                <a16:creationId xmlns:a16="http://schemas.microsoft.com/office/drawing/2014/main" id="{C71F8F9D-2090-E086-89D8-16023E342C0E}"/>
+              </a:ext>
+            </a:extLst>
+          </p:cNvPr>
+          <p:cNvSpPr txBox="1">
+            <a:spLocks/>
+          </p:cNvSpPr>
+          <p:nvPr/>
+        </p:nvSpPr>
+        <p:spPr>
+          <a:xfrm>
+            <a:off x="2637502" y="517525"/>
+            <a:ext cx="2580969" cy="1325563"/>
+          </a:xfrm>
+          <a:prstGeom prst="rect">
+            <a:avLst/>
+          </a:prstGeom>
+        </p:spPr>
+        <p:txBody>
+          <a:bodyPr vert="horz" lIns="91440" tIns="45720" rIns="91440" bIns="45720" rtlCol="0" anchor="ctr">
+            <a:normAutofit/>
+          </a:bodyPr>
+          <a:lstStyle>
+            <a:lvl1pPr algn="l" defTabSz="914400" rtl="0" eaLnBrk="1" latinLnBrk="0" hangingPunct="1">
+              <a:lnSpc>
+                <a:spcPct val="90000"/>
+              </a:lnSpc>
+              <a:spcBef>
+                <a:spcPct val="0"/>
+              </a:spcBef>
+              <a:buNone/>
+              <a:defRPr sz="4400" kern="1200">
+                <a:solidFill>
+                  <a:schemeClr val="tx1"/>
+                </a:solidFill>
+                <a:latin typeface="+mj-lt"/>
+                <a:ea typeface="+mj-ea"/>
+                <a:cs typeface="+mj-cs"/>
+              </a:defRPr>
+            </a:lvl1pPr>
+          </a:lstStyle>
+          <a:p>
+            <a:r>
+              <a:rPr lang="de-DE"/>
+              <a:t>HOG-SVM</a:t>
+            </a:r>
+            <a:endParaRPr lang="de-DE" dirty="0"/>
+          </a:p>
+        </p:txBody>
+      </p:sp>
+    </p:spTree>
+    <p:extLst>
+      <p:ext uri="{BB962C8B-B14F-4D97-AF65-F5344CB8AC3E}">
+        <p14:creationId xmlns:p14="http://schemas.microsoft.com/office/powerpoint/2010/main" val="1501186825"/>
+      </p:ext>
+    </p:extLst>
+  </p:cSld>
+  <p:clrMapOvr>
+    <a:masterClrMapping/>
+  </p:clrMapOvr>
+</p:sld>
+</file>
+
 <file path=ppt/slides/slide2.xml><?xml version="1.0" encoding="utf-8"?>
 <p:sld xmlns:a="http://schemas.openxmlformats.org/drawingml/2006/main" xmlns:r="http://schemas.openxmlformats.org/officeDocument/2006/relationships" xmlns:p="http://schemas.openxmlformats.org/presentationml/2006/main">
   <p:cSld>
@@ -4720,14 +5071,38 @@
               <a:t> (SVM)</a:t>
             </a:r>
           </a:p>
+          <a:p>
+            <a:r>
+              <a:rPr lang="de-DE" dirty="0"/>
+              <a:t>Kernel zu Vektor pro Pixel über</a:t>
+            </a:r>
+            <a:br>
+              <a:rPr lang="de-DE" dirty="0"/>
+            </a:br>
+            <a:r>
+              <a:rPr lang="de-DE" dirty="0" err="1"/>
+              <a:t>Histogram</a:t>
+            </a:r>
+            <a:r>
+              <a:rPr lang="de-DE" dirty="0"/>
+              <a:t> und Normalisierung</a:t>
+            </a:r>
+            <a:br>
+              <a:rPr lang="de-DE" dirty="0"/>
+            </a:br>
+            <a:r>
+              <a:rPr lang="de-DE" dirty="0"/>
+              <a:t>zu langem Vektorarray</a:t>
+            </a:r>
+          </a:p>
         </p:txBody>
       </p:sp>
       <p:pic>
         <p:nvPicPr>
-          <p:cNvPr id="9" name="Grafik 8" descr="Ein Bild, das Zeichnung, Haus, Entwurf, Bild enthält.&#10;&#10;KI-generierte Inhalte können fehlerhaft sein.">
-            <a:extLst>
-              <a:ext uri="{FF2B5EF4-FFF2-40B4-BE49-F238E27FC236}">
-                <a16:creationId xmlns:a16="http://schemas.microsoft.com/office/drawing/2014/main" id="{58DB5F62-C445-0731-1B10-915017CB7F39}"/>
+          <p:cNvPr id="3" name="Grafik 2" descr="Ein Bild, das Kleidung, Menschliches Gesicht, Person, Druckanzug enthält.&#10;&#10;KI-generierte Inhalte können fehlerhaft sein.">
+            <a:extLst>
+              <a:ext uri="{FF2B5EF4-FFF2-40B4-BE49-F238E27FC236}">
+                <a16:creationId xmlns:a16="http://schemas.microsoft.com/office/drawing/2014/main" id="{56561303-F802-0612-FAA6-075BA05B7074}"/>
               </a:ext>
             </a:extLst>
           </p:cNvPr>
@@ -4750,8 +5125,79 @@
         </p:blipFill>
         <p:spPr>
           <a:xfrm>
-            <a:off x="6995815" y="1825625"/>
-            <a:ext cx="4709169" cy="2843790"/>
+            <a:off x="6096000" y="3417649"/>
+            <a:ext cx="5918483" cy="2894251"/>
+          </a:xfrm>
+          <a:prstGeom prst="rect">
+            <a:avLst/>
+          </a:prstGeom>
+        </p:spPr>
+      </p:pic>
+      <p:sp>
+        <p:nvSpPr>
+          <p:cNvPr id="4" name="Textfeld 3">
+            <a:extLst>
+              <a:ext uri="{FF2B5EF4-FFF2-40B4-BE49-F238E27FC236}">
+                <a16:creationId xmlns:a16="http://schemas.microsoft.com/office/drawing/2014/main" id="{E092D404-7FFE-03C9-35D5-B271F5A76E1D}"/>
+              </a:ext>
+            </a:extLst>
+          </p:cNvPr>
+          <p:cNvSpPr txBox="1"/>
+          <p:nvPr/>
+        </p:nvSpPr>
+        <p:spPr>
+          <a:xfrm>
+            <a:off x="6197600" y="6311900"/>
+            <a:ext cx="5156200" cy="523220"/>
+          </a:xfrm>
+          <a:prstGeom prst="rect">
+            <a:avLst/>
+          </a:prstGeom>
+          <a:noFill/>
+        </p:spPr>
+        <p:txBody>
+          <a:bodyPr wrap="square" rtlCol="0">
+            <a:spAutoFit/>
+          </a:bodyPr>
+          <a:lstStyle/>
+          <a:p>
+            <a:r>
+              <a:rPr lang="de-DE" sz="1400" dirty="0"/>
+              <a:t>https://iq.opengenus.org/object-detection-with-histogram-of-oriented-gradients-hog/</a:t>
+            </a:r>
+          </a:p>
+        </p:txBody>
+      </p:sp>
+      <p:pic>
+        <p:nvPicPr>
+          <p:cNvPr id="13" name="Grafik 12" descr="Ein Bild, das Zeichnung, Haus, Entwurf, Bild enthält.&#10;&#10;KI-generierte Inhalte können fehlerhaft sein.">
+            <a:extLst>
+              <a:ext uri="{FF2B5EF4-FFF2-40B4-BE49-F238E27FC236}">
+                <a16:creationId xmlns:a16="http://schemas.microsoft.com/office/drawing/2014/main" id="{58DB5F62-C445-0731-1B10-915017CB7F39}"/>
+              </a:ext>
+            </a:extLst>
+          </p:cNvPr>
+          <p:cNvPicPr>
+            <a:picLocks noChangeAspect="1"/>
+          </p:cNvPicPr>
+          <p:nvPr/>
+        </p:nvPicPr>
+        <p:blipFill>
+          <a:blip r:embed="rId4">
+            <a:extLst>
+              <a:ext uri="{28A0092B-C50C-407E-A947-70E740481C1C}">
+                <a14:useLocalDpi xmlns:a14="http://schemas.microsoft.com/office/drawing/2010/main" val="0"/>
+              </a:ext>
+            </a:extLst>
+          </a:blip>
+          <a:stretch>
+            <a:fillRect/>
+          </a:stretch>
+        </p:blipFill>
+        <p:spPr>
+          <a:xfrm>
+            <a:off x="6820460" y="456820"/>
+            <a:ext cx="4533340" cy="2737610"/>
           </a:xfrm>
           <a:prstGeom prst="rect">
             <a:avLst/>
@@ -4793,6 +5239,277 @@
           <p:cNvPr id="2" name="Titel 1">
             <a:extLst>
               <a:ext uri="{FF2B5EF4-FFF2-40B4-BE49-F238E27FC236}">
+                <a16:creationId xmlns:a16="http://schemas.microsoft.com/office/drawing/2014/main" id="{824085D8-E7C6-502E-8D5D-3185F7265F80}"/>
+              </a:ext>
+            </a:extLst>
+          </p:cNvPr>
+          <p:cNvSpPr>
+            <a:spLocks noGrp="1"/>
+          </p:cNvSpPr>
+          <p:nvPr>
+            <p:ph type="title"/>
+          </p:nvPr>
+        </p:nvSpPr>
+        <p:spPr/>
+        <p:txBody>
+          <a:bodyPr/>
+          <a:lstStyle/>
+          <a:p>
+            <a:r>
+              <a:rPr lang="de-DE" dirty="0"/>
+              <a:t>HOG</a:t>
+            </a:r>
+          </a:p>
+        </p:txBody>
+      </p:sp>
+      <p:pic>
+        <p:nvPicPr>
+          <p:cNvPr id="15" name="Grafik 14" descr="Ein Bild, das Diagramm, Reihe, Rechteck, Zahl enthält.&#10;&#10;KI-generierte Inhalte können fehlerhaft sein.">
+            <a:extLst>
+              <a:ext uri="{FF2B5EF4-FFF2-40B4-BE49-F238E27FC236}">
+                <a16:creationId xmlns:a16="http://schemas.microsoft.com/office/drawing/2014/main" id="{813272D4-4865-0D02-8A07-593559831E9C}"/>
+              </a:ext>
+            </a:extLst>
+          </p:cNvPr>
+          <p:cNvPicPr>
+            <a:picLocks noChangeAspect="1"/>
+          </p:cNvPicPr>
+          <p:nvPr/>
+        </p:nvPicPr>
+        <p:blipFill>
+          <a:blip r:embed="rId2">
+            <a:extLst>
+              <a:ext uri="{28A0092B-C50C-407E-A947-70E740481C1C}">
+                <a14:useLocalDpi xmlns:a14="http://schemas.microsoft.com/office/drawing/2010/main" val="0"/>
+              </a:ext>
+            </a:extLst>
+          </a:blip>
+          <a:stretch>
+            <a:fillRect/>
+          </a:stretch>
+        </p:blipFill>
+        <p:spPr>
+          <a:xfrm>
+            <a:off x="6604557" y="492936"/>
+            <a:ext cx="3882821" cy="2395503"/>
+          </a:xfrm>
+          <a:prstGeom prst="rect">
+            <a:avLst/>
+          </a:prstGeom>
+        </p:spPr>
+      </p:pic>
+      <p:pic>
+        <p:nvPicPr>
+          <p:cNvPr id="17" name="Grafik 16" descr="Ein Bild, das Text, Schrift, Handschrift, weiß enthält.&#10;&#10;KI-generierte Inhalte können fehlerhaft sein.">
+            <a:extLst>
+              <a:ext uri="{FF2B5EF4-FFF2-40B4-BE49-F238E27FC236}">
+                <a16:creationId xmlns:a16="http://schemas.microsoft.com/office/drawing/2014/main" id="{891564CB-294D-401D-1E86-6236F5F028CC}"/>
+              </a:ext>
+            </a:extLst>
+          </p:cNvPr>
+          <p:cNvPicPr>
+            <a:picLocks noChangeAspect="1"/>
+          </p:cNvPicPr>
+          <p:nvPr/>
+        </p:nvPicPr>
+        <p:blipFill>
+          <a:blip r:embed="rId3">
+            <a:extLst>
+              <a:ext uri="{28A0092B-C50C-407E-A947-70E740481C1C}">
+                <a14:useLocalDpi xmlns:a14="http://schemas.microsoft.com/office/drawing/2010/main" val="0"/>
+              </a:ext>
+            </a:extLst>
+          </a:blip>
+          <a:stretch>
+            <a:fillRect/>
+          </a:stretch>
+        </p:blipFill>
+        <p:spPr>
+          <a:xfrm>
+            <a:off x="7448511" y="3733800"/>
+            <a:ext cx="2781934" cy="1880028"/>
+          </a:xfrm>
+          <a:prstGeom prst="rect">
+            <a:avLst/>
+          </a:prstGeom>
+        </p:spPr>
+      </p:pic>
+      <p:sp>
+        <p:nvSpPr>
+          <p:cNvPr id="18" name="Textfeld 17">
+            <a:extLst>
+              <a:ext uri="{FF2B5EF4-FFF2-40B4-BE49-F238E27FC236}">
+                <a16:creationId xmlns:a16="http://schemas.microsoft.com/office/drawing/2014/main" id="{188CDE24-E3F8-E1BD-002B-F9FADC4C6EFA}"/>
+              </a:ext>
+            </a:extLst>
+          </p:cNvPr>
+          <p:cNvSpPr txBox="1"/>
+          <p:nvPr/>
+        </p:nvSpPr>
+        <p:spPr>
+          <a:xfrm>
+            <a:off x="7010399" y="5858933"/>
+            <a:ext cx="4741334" cy="307777"/>
+          </a:xfrm>
+          <a:prstGeom prst="rect">
+            <a:avLst/>
+          </a:prstGeom>
+          <a:noFill/>
+        </p:spPr>
+        <p:txBody>
+          <a:bodyPr wrap="square" rtlCol="0">
+            <a:spAutoFit/>
+          </a:bodyPr>
+          <a:lstStyle/>
+          <a:p>
+            <a:r>
+              <a:rPr lang="de-DE" sz="1400" dirty="0"/>
+              <a:t>https://learnopencv.com/histogram-of-oriented-gradients/</a:t>
+            </a:r>
+          </a:p>
+        </p:txBody>
+      </p:sp>
+      <p:sp>
+        <p:nvSpPr>
+          <p:cNvPr id="19" name="Textfeld 18">
+            <a:extLst>
+              <a:ext uri="{FF2B5EF4-FFF2-40B4-BE49-F238E27FC236}">
+                <a16:creationId xmlns:a16="http://schemas.microsoft.com/office/drawing/2014/main" id="{97EB9014-83E8-9CE6-F470-8E77DE2207CB}"/>
+              </a:ext>
+            </a:extLst>
+          </p:cNvPr>
+          <p:cNvSpPr txBox="1"/>
+          <p:nvPr/>
+        </p:nvSpPr>
+        <p:spPr>
+          <a:xfrm>
+            <a:off x="6612466" y="2703214"/>
+            <a:ext cx="4741334" cy="307777"/>
+          </a:xfrm>
+          <a:prstGeom prst="rect">
+            <a:avLst/>
+          </a:prstGeom>
+          <a:noFill/>
+        </p:spPr>
+        <p:txBody>
+          <a:bodyPr wrap="square" rtlCol="0">
+            <a:spAutoFit/>
+          </a:bodyPr>
+          <a:lstStyle/>
+          <a:p>
+            <a:r>
+              <a:rPr lang="de-DE" sz="1400" dirty="0"/>
+              <a:t>https://learnopencv.com/histogram-of-oriented-gradients/</a:t>
+            </a:r>
+          </a:p>
+        </p:txBody>
+      </p:sp>
+      <p:pic>
+        <p:nvPicPr>
+          <p:cNvPr id="21" name="Grafik 20" descr="Ein Bild, das Screenshot, Text enthält.&#10;&#10;KI-generierte Inhalte können fehlerhaft sein.">
+            <a:extLst>
+              <a:ext uri="{FF2B5EF4-FFF2-40B4-BE49-F238E27FC236}">
+                <a16:creationId xmlns:a16="http://schemas.microsoft.com/office/drawing/2014/main" id="{4A8C7854-1D7C-AC1E-5573-D972F0F0822B}"/>
+              </a:ext>
+            </a:extLst>
+          </p:cNvPr>
+          <p:cNvPicPr>
+            <a:picLocks noChangeAspect="1"/>
+          </p:cNvPicPr>
+          <p:nvPr/>
+        </p:nvPicPr>
+        <p:blipFill>
+          <a:blip r:embed="rId4">
+            <a:extLst>
+              <a:ext uri="{28A0092B-C50C-407E-A947-70E740481C1C}">
+                <a14:useLocalDpi xmlns:a14="http://schemas.microsoft.com/office/drawing/2010/main" val="0"/>
+              </a:ext>
+            </a:extLst>
+          </a:blip>
+          <a:stretch>
+            <a:fillRect/>
+          </a:stretch>
+        </p:blipFill>
+        <p:spPr>
+          <a:xfrm>
+            <a:off x="701622" y="1690687"/>
+            <a:ext cx="5394378" cy="3034337"/>
+          </a:xfrm>
+          <a:prstGeom prst="rect">
+            <a:avLst/>
+          </a:prstGeom>
+        </p:spPr>
+      </p:pic>
+      <p:sp>
+        <p:nvSpPr>
+          <p:cNvPr id="22" name="Textfeld 21">
+            <a:extLst>
+              <a:ext uri="{FF2B5EF4-FFF2-40B4-BE49-F238E27FC236}">
+                <a16:creationId xmlns:a16="http://schemas.microsoft.com/office/drawing/2014/main" id="{8EDFCD3C-C657-33B6-18C7-D9FF4591C5F4}"/>
+              </a:ext>
+            </a:extLst>
+          </p:cNvPr>
+          <p:cNvSpPr txBox="1"/>
+          <p:nvPr/>
+        </p:nvSpPr>
+        <p:spPr>
+          <a:xfrm>
+            <a:off x="838200" y="4725024"/>
+            <a:ext cx="4741334" cy="307777"/>
+          </a:xfrm>
+          <a:prstGeom prst="rect">
+            <a:avLst/>
+          </a:prstGeom>
+          <a:noFill/>
+        </p:spPr>
+        <p:txBody>
+          <a:bodyPr wrap="square" rtlCol="0">
+            <a:spAutoFit/>
+          </a:bodyPr>
+          <a:lstStyle/>
+          <a:p>
+            <a:r>
+              <a:rPr lang="de-DE" sz="1400" dirty="0"/>
+              <a:t>https://learnopencv.com/histogram-of-oriented-gradients/</a:t>
+            </a:r>
+          </a:p>
+        </p:txBody>
+      </p:sp>
+    </p:spTree>
+    <p:extLst>
+      <p:ext uri="{BB962C8B-B14F-4D97-AF65-F5344CB8AC3E}">
+        <p14:creationId xmlns:p14="http://schemas.microsoft.com/office/powerpoint/2010/main" val="3086592521"/>
+      </p:ext>
+    </p:extLst>
+  </p:cSld>
+  <p:clrMapOvr>
+    <a:masterClrMapping/>
+  </p:clrMapOvr>
+</p:sld>
+</file>
+
+<file path=ppt/slides/slide7.xml><?xml version="1.0" encoding="utf-8"?>
+<p:sld xmlns:a="http://schemas.openxmlformats.org/drawingml/2006/main" xmlns:r="http://schemas.openxmlformats.org/officeDocument/2006/relationships" xmlns:p="http://schemas.openxmlformats.org/presentationml/2006/main">
+  <p:cSld>
+    <p:spTree>
+      <p:nvGrpSpPr>
+        <p:cNvPr id="1" name=""/>
+        <p:cNvGrpSpPr/>
+        <p:nvPr/>
+      </p:nvGrpSpPr>
+      <p:grpSpPr>
+        <a:xfrm>
+          <a:off x="0" y="0"/>
+          <a:ext cx="0" cy="0"/>
+          <a:chOff x="0" y="0"/>
+          <a:chExt cx="0" cy="0"/>
+        </a:xfrm>
+      </p:grpSpPr>
+      <p:sp>
+        <p:nvSpPr>
+          <p:cNvPr id="2" name="Titel 1">
+            <a:extLst>
+              <a:ext uri="{FF2B5EF4-FFF2-40B4-BE49-F238E27FC236}">
                 <a16:creationId xmlns:a16="http://schemas.microsoft.com/office/drawing/2014/main" id="{9D552788-01EB-F689-235E-B633B7C47FA6}"/>
               </a:ext>
             </a:extLst>
@@ -4886,7 +5603,7 @@
 </p:sld>
 </file>
 
-<file path=ppt/slides/slide7.xml><?xml version="1.0" encoding="utf-8"?>
+<file path=ppt/slides/slide8.xml><?xml version="1.0" encoding="utf-8"?>
 <p:sld xmlns:a="http://schemas.openxmlformats.org/drawingml/2006/main" xmlns:r="http://schemas.openxmlformats.org/officeDocument/2006/relationships" xmlns:p="http://schemas.openxmlformats.org/presentationml/2006/main">
   <p:cSld>
     <p:spTree>
@@ -5052,7 +5769,7 @@
 </p:sld>
 </file>
 
-<file path=ppt/slides/slide8.xml><?xml version="1.0" encoding="utf-8"?>
+<file path=ppt/slides/slide9.xml><?xml version="1.0" encoding="utf-8"?>
 <p:sld xmlns:a="http://schemas.openxmlformats.org/drawingml/2006/main" xmlns:r="http://schemas.openxmlformats.org/officeDocument/2006/relationships" xmlns:p="http://schemas.openxmlformats.org/presentationml/2006/main">
   <p:cSld>
     <p:bg>
@@ -5322,351 +6039,6 @@
     <p:extLst>
       <p:ext uri="{BB962C8B-B14F-4D97-AF65-F5344CB8AC3E}">
         <p14:creationId xmlns:p14="http://schemas.microsoft.com/office/powerpoint/2010/main" val="4091636340"/>
-      </p:ext>
-    </p:extLst>
-  </p:cSld>
-  <p:clrMapOvr>
-    <a:masterClrMapping/>
-  </p:clrMapOvr>
-</p:sld>
-</file>
-
-<file path=ppt/slides/slide9.xml><?xml version="1.0" encoding="utf-8"?>
-<p:sld xmlns:a="http://schemas.openxmlformats.org/drawingml/2006/main" xmlns:r="http://schemas.openxmlformats.org/officeDocument/2006/relationships" xmlns:p="http://schemas.openxmlformats.org/presentationml/2006/main">
-  <p:cSld>
-    <p:spTree>
-      <p:nvGrpSpPr>
-        <p:cNvPr id="1" name=""/>
-        <p:cNvGrpSpPr/>
-        <p:nvPr/>
-      </p:nvGrpSpPr>
-      <p:grpSpPr>
-        <a:xfrm>
-          <a:off x="0" y="0"/>
-          <a:ext cx="0" cy="0"/>
-          <a:chOff x="0" y="0"/>
-          <a:chExt cx="0" cy="0"/>
-        </a:xfrm>
-      </p:grpSpPr>
-      <p:sp>
-        <p:nvSpPr>
-          <p:cNvPr id="2" name="Titel 1">
-            <a:extLst>
-              <a:ext uri="{FF2B5EF4-FFF2-40B4-BE49-F238E27FC236}">
-                <a16:creationId xmlns:a16="http://schemas.microsoft.com/office/drawing/2014/main" id="{7EAC4DB8-0274-D840-CA37-9FA1C57E109D}"/>
-              </a:ext>
-            </a:extLst>
-          </p:cNvPr>
-          <p:cNvSpPr>
-            <a:spLocks noGrp="1"/>
-          </p:cNvSpPr>
-          <p:nvPr>
-            <p:ph type="title"/>
-          </p:nvPr>
-        </p:nvSpPr>
-        <p:spPr>
-          <a:xfrm>
-            <a:off x="7644582" y="505618"/>
-            <a:ext cx="2580969" cy="1325563"/>
-          </a:xfrm>
-        </p:spPr>
-        <p:txBody>
-          <a:bodyPr/>
-          <a:lstStyle/>
-          <a:p>
-            <a:r>
-              <a:rPr lang="de-DE" dirty="0"/>
-              <a:t>CNN</a:t>
-            </a:r>
-          </a:p>
-        </p:txBody>
-      </p:sp>
-      <p:sp>
-        <p:nvSpPr>
-          <p:cNvPr id="6" name="Inhaltsplatzhalter 5">
-            <a:extLst>
-              <a:ext uri="{FF2B5EF4-FFF2-40B4-BE49-F238E27FC236}">
-                <a16:creationId xmlns:a16="http://schemas.microsoft.com/office/drawing/2014/main" id="{E3857153-118B-52BE-2C3E-D127FAAE4CB2}"/>
-              </a:ext>
-            </a:extLst>
-          </p:cNvPr>
-          <p:cNvSpPr>
-            <a:spLocks noGrp="1"/>
-          </p:cNvSpPr>
-          <p:nvPr>
-            <p:ph idx="1"/>
-          </p:nvPr>
-        </p:nvSpPr>
-        <p:spPr>
-          <a:xfrm>
-            <a:off x="6933600" y="2747563"/>
-            <a:ext cx="8603400" cy="4351338"/>
-          </a:xfrm>
-        </p:spPr>
-        <p:txBody>
-          <a:bodyPr/>
-          <a:lstStyle/>
-          <a:p>
-            <a:r>
-              <a:rPr lang="en-US" dirty="0"/>
-              <a:t>keep right - 0.97</a:t>
-            </a:r>
-          </a:p>
-          <a:p>
-            <a:endParaRPr lang="en-US" dirty="0"/>
-          </a:p>
-          <a:p>
-            <a:r>
-              <a:rPr lang="en-US" dirty="0"/>
-              <a:t>no entry - 0.99</a:t>
-            </a:r>
-          </a:p>
-          <a:p>
-            <a:pPr lvl="1"/>
-            <a:endParaRPr lang="en-US" dirty="0"/>
-          </a:p>
-          <a:p>
-            <a:r>
-              <a:rPr lang="en-US" dirty="0"/>
-              <a:t>speed limit 70 - 0.99</a:t>
-            </a:r>
-          </a:p>
-          <a:p>
-            <a:endParaRPr lang="en-US" dirty="0"/>
-          </a:p>
-          <a:p>
-            <a:r>
-              <a:rPr lang="en-US" dirty="0"/>
-              <a:t>speed limit 70 - 0.99</a:t>
-            </a:r>
-            <a:endParaRPr lang="de-DE" dirty="0"/>
-          </a:p>
-        </p:txBody>
-      </p:sp>
-      <p:pic>
-        <p:nvPicPr>
-          <p:cNvPr id="9" name="Grafik 8">
-            <a:extLst>
-              <a:ext uri="{FF2B5EF4-FFF2-40B4-BE49-F238E27FC236}">
-                <a16:creationId xmlns:a16="http://schemas.microsoft.com/office/drawing/2014/main" id="{316BC47F-57E6-758B-5FA1-4B2D6C2D569E}"/>
-              </a:ext>
-            </a:extLst>
-          </p:cNvPr>
-          <p:cNvPicPr>
-            <a:picLocks noChangeAspect="1"/>
-          </p:cNvPicPr>
-          <p:nvPr/>
-        </p:nvPicPr>
-        <p:blipFill>
-          <a:blip r:embed="rId2"/>
-          <a:stretch>
-            <a:fillRect/>
-          </a:stretch>
-        </p:blipFill>
-        <p:spPr>
-          <a:xfrm>
-            <a:off x="785137" y="1168400"/>
-            <a:ext cx="1304925" cy="5324475"/>
-          </a:xfrm>
-          <a:prstGeom prst="rect">
-            <a:avLst/>
-          </a:prstGeom>
-        </p:spPr>
-      </p:pic>
-      <p:pic>
-        <p:nvPicPr>
-          <p:cNvPr id="11" name="Grafik 10">
-            <a:extLst>
-              <a:ext uri="{FF2B5EF4-FFF2-40B4-BE49-F238E27FC236}">
-                <a16:creationId xmlns:a16="http://schemas.microsoft.com/office/drawing/2014/main" id="{F394525A-FB46-4C64-7E0A-D1CC2F763165}"/>
-              </a:ext>
-            </a:extLst>
-          </p:cNvPr>
-          <p:cNvPicPr>
-            <a:picLocks noChangeAspect="1"/>
-          </p:cNvPicPr>
-          <p:nvPr/>
-        </p:nvPicPr>
-        <p:blipFill>
-          <a:blip r:embed="rId3"/>
-          <a:stretch>
-            <a:fillRect/>
-          </a:stretch>
-        </p:blipFill>
-        <p:spPr>
-          <a:xfrm>
-            <a:off x="10429800" y="1342426"/>
-            <a:ext cx="1066800" cy="5324475"/>
-          </a:xfrm>
-          <a:prstGeom prst="rect">
-            <a:avLst/>
-          </a:prstGeom>
-        </p:spPr>
-      </p:pic>
-      <p:sp>
-        <p:nvSpPr>
-          <p:cNvPr id="12" name="Textfeld 11">
-            <a:extLst>
-              <a:ext uri="{FF2B5EF4-FFF2-40B4-BE49-F238E27FC236}">
-                <a16:creationId xmlns:a16="http://schemas.microsoft.com/office/drawing/2014/main" id="{7C04BD8E-4037-B686-6A41-18723423633D}"/>
-              </a:ext>
-            </a:extLst>
-          </p:cNvPr>
-          <p:cNvSpPr txBox="1"/>
-          <p:nvPr/>
-        </p:nvSpPr>
-        <p:spPr>
-          <a:xfrm>
-            <a:off x="2109617" y="2747563"/>
-            <a:ext cx="3107967" cy="3539430"/>
-          </a:xfrm>
-          <a:prstGeom prst="rect">
-            <a:avLst/>
-          </a:prstGeom>
-          <a:noFill/>
-        </p:spPr>
-        <p:txBody>
-          <a:bodyPr wrap="none" rtlCol="0">
-            <a:spAutoFit/>
-          </a:bodyPr>
-          <a:lstStyle/>
-          <a:p>
-            <a:pPr marL="457200" indent="-457200">
-              <a:buFont typeface="Arial" panose="020B0604020202020204" pitchFamily="34" charset="0"/>
-              <a:buChar char="•"/>
-            </a:pPr>
-            <a:r>
-              <a:rPr lang="en-US" sz="2800" dirty="0"/>
-              <a:t>mandatory</a:t>
-            </a:r>
-          </a:p>
-          <a:p>
-            <a:pPr marL="457200" indent="-457200">
-              <a:buFont typeface="Arial" panose="020B0604020202020204" pitchFamily="34" charset="0"/>
-              <a:buChar char="•"/>
-            </a:pPr>
-            <a:r>
-              <a:rPr lang="en-US" sz="2800" dirty="0"/>
-              <a:t>keep right - 0.87</a:t>
-            </a:r>
-          </a:p>
-          <a:p>
-            <a:pPr marL="457200" indent="-457200">
-              <a:buFont typeface="Arial" panose="020B0604020202020204" pitchFamily="34" charset="0"/>
-              <a:buChar char="•"/>
-            </a:pPr>
-            <a:endParaRPr lang="en-US" sz="2800" dirty="0"/>
-          </a:p>
-          <a:p>
-            <a:pPr marL="457200" indent="-457200">
-              <a:buFont typeface="Arial" panose="020B0604020202020204" pitchFamily="34" charset="0"/>
-              <a:buChar char="•"/>
-            </a:pPr>
-            <a:r>
-              <a:rPr lang="en-US" sz="2800" dirty="0" err="1"/>
-              <a:t>no_entry</a:t>
-            </a:r>
-            <a:endParaRPr lang="en-US" sz="2800" dirty="0"/>
-          </a:p>
-          <a:p>
-            <a:pPr marL="457200" indent="-457200">
-              <a:buFont typeface="Arial" panose="020B0604020202020204" pitchFamily="34" charset="0"/>
-              <a:buChar char="•"/>
-            </a:pPr>
-            <a:r>
-              <a:rPr lang="en-US" sz="2800" dirty="0"/>
-              <a:t>no entry - 0.98</a:t>
-            </a:r>
-          </a:p>
-          <a:p>
-            <a:pPr marL="457200" indent="-457200">
-              <a:buFont typeface="Arial" panose="020B0604020202020204" pitchFamily="34" charset="0"/>
-              <a:buChar char="•"/>
-            </a:pPr>
-            <a:endParaRPr lang="en-US" sz="2800" dirty="0"/>
-          </a:p>
-          <a:p>
-            <a:pPr marL="457200" indent="-457200">
-              <a:buFont typeface="Arial" panose="020B0604020202020204" pitchFamily="34" charset="0"/>
-              <a:buChar char="•"/>
-            </a:pPr>
-            <a:r>
-              <a:rPr lang="en-US" sz="2800" dirty="0"/>
-              <a:t>prohibitory</a:t>
-            </a:r>
-          </a:p>
-          <a:p>
-            <a:pPr marL="457200" indent="-457200">
-              <a:buFont typeface="Arial" panose="020B0604020202020204" pitchFamily="34" charset="0"/>
-              <a:buChar char="•"/>
-            </a:pPr>
-            <a:r>
-              <a:rPr lang="en-US" sz="2800" dirty="0"/>
-              <a:t>keep right - 0.87</a:t>
-            </a:r>
-            <a:endParaRPr lang="de-DE" sz="2800" dirty="0"/>
-          </a:p>
-        </p:txBody>
-      </p:sp>
-      <p:sp>
-        <p:nvSpPr>
-          <p:cNvPr id="13" name="Titel 1">
-            <a:extLst>
-              <a:ext uri="{FF2B5EF4-FFF2-40B4-BE49-F238E27FC236}">
-                <a16:creationId xmlns:a16="http://schemas.microsoft.com/office/drawing/2014/main" id="{C71F8F9D-2090-E086-89D8-16023E342C0E}"/>
-              </a:ext>
-            </a:extLst>
-          </p:cNvPr>
-          <p:cNvSpPr txBox="1">
-            <a:spLocks/>
-          </p:cNvSpPr>
-          <p:nvPr/>
-        </p:nvSpPr>
-        <p:spPr>
-          <a:xfrm>
-            <a:off x="2637502" y="517525"/>
-            <a:ext cx="2580969" cy="1325563"/>
-          </a:xfrm>
-          <a:prstGeom prst="rect">
-            <a:avLst/>
-          </a:prstGeom>
-        </p:spPr>
-        <p:txBody>
-          <a:bodyPr vert="horz" lIns="91440" tIns="45720" rIns="91440" bIns="45720" rtlCol="0" anchor="ctr">
-            <a:normAutofit/>
-          </a:bodyPr>
-          <a:lstStyle>
-            <a:lvl1pPr algn="l" defTabSz="914400" rtl="0" eaLnBrk="1" latinLnBrk="0" hangingPunct="1">
-              <a:lnSpc>
-                <a:spcPct val="90000"/>
-              </a:lnSpc>
-              <a:spcBef>
-                <a:spcPct val="0"/>
-              </a:spcBef>
-              <a:buNone/>
-              <a:defRPr sz="4400" kern="1200">
-                <a:solidFill>
-                  <a:schemeClr val="tx1"/>
-                </a:solidFill>
-                <a:latin typeface="+mj-lt"/>
-                <a:ea typeface="+mj-ea"/>
-                <a:cs typeface="+mj-cs"/>
-              </a:defRPr>
-            </a:lvl1pPr>
-          </a:lstStyle>
-          <a:p>
-            <a:r>
-              <a:rPr lang="de-DE"/>
-              <a:t>HOG-SVM</a:t>
-            </a:r>
-            <a:endParaRPr lang="de-DE" dirty="0"/>
-          </a:p>
-        </p:txBody>
-      </p:sp>
-    </p:spTree>
-    <p:extLst>
-      <p:ext uri="{BB962C8B-B14F-4D97-AF65-F5344CB8AC3E}">
-        <p14:creationId xmlns:p14="http://schemas.microsoft.com/office/powerpoint/2010/main" val="1501186825"/>
       </p:ext>
     </p:extLst>
   </p:cSld>

</xml_diff>

<commit_message>
Add names to Titleslide, minimal layouting
</commit_message>
<xml_diff>
--- a/docs/group_project_presentation.pptx
+++ b/docs/group_project_presentation.pptx
@@ -364,7 +364,7 @@
           <a:p>
             <a:fld id="{10802DB9-3DC2-4085-8DEC-EFBEC8B5AB78}" type="slidenum">
               <a:rPr lang="de-DE" smtClean="0"/>
-              <a:t>‹Nr.›</a:t>
+              <a:t>‹#›</a:t>
             </a:fld>
             <a:endParaRPr lang="de-DE"/>
           </a:p>
@@ -1010,7 +1010,7 @@
           <a:p>
             <a:fld id="{6B7A296C-764E-4169-9E16-58B9AF5DE7BA}" type="slidenum">
               <a:rPr lang="de-DE" smtClean="0"/>
-              <a:t>‹Nr.›</a:t>
+              <a:t>‹#›</a:t>
             </a:fld>
             <a:endParaRPr lang="de-DE"/>
           </a:p>
@@ -1208,7 +1208,7 @@
           <a:p>
             <a:fld id="{6B7A296C-764E-4169-9E16-58B9AF5DE7BA}" type="slidenum">
               <a:rPr lang="de-DE" smtClean="0"/>
-              <a:t>‹Nr.›</a:t>
+              <a:t>‹#›</a:t>
             </a:fld>
             <a:endParaRPr lang="de-DE"/>
           </a:p>
@@ -1416,7 +1416,7 @@
           <a:p>
             <a:fld id="{6B7A296C-764E-4169-9E16-58B9AF5DE7BA}" type="slidenum">
               <a:rPr lang="de-DE" smtClean="0"/>
-              <a:t>‹Nr.›</a:t>
+              <a:t>‹#›</a:t>
             </a:fld>
             <a:endParaRPr lang="de-DE"/>
           </a:p>
@@ -1587,7 +1587,7 @@
           <a:bodyPr/>
           <a:lstStyle/>
           <a:p>
-            <a:endParaRPr lang="de-DE"/>
+            <a:endParaRPr lang="de-DE" dirty="0"/>
           </a:p>
         </p:txBody>
       </p:sp>
@@ -1614,7 +1614,7 @@
           <a:p>
             <a:fld id="{6B7A296C-764E-4169-9E16-58B9AF5DE7BA}" type="slidenum">
               <a:rPr lang="de-DE" smtClean="0"/>
-              <a:t>‹Nr.›</a:t>
+              <a:t>‹#›</a:t>
             </a:fld>
             <a:endParaRPr lang="de-DE"/>
           </a:p>
@@ -1889,7 +1889,7 @@
           <a:p>
             <a:fld id="{6B7A296C-764E-4169-9E16-58B9AF5DE7BA}" type="slidenum">
               <a:rPr lang="de-DE" smtClean="0"/>
-              <a:t>‹Nr.›</a:t>
+              <a:t>‹#›</a:t>
             </a:fld>
             <a:endParaRPr lang="de-DE"/>
           </a:p>
@@ -2154,7 +2154,7 @@
           <a:p>
             <a:fld id="{6B7A296C-764E-4169-9E16-58B9AF5DE7BA}" type="slidenum">
               <a:rPr lang="de-DE" smtClean="0"/>
-              <a:t>‹Nr.›</a:t>
+              <a:t>‹#›</a:t>
             </a:fld>
             <a:endParaRPr lang="de-DE"/>
           </a:p>
@@ -2566,7 +2566,7 @@
           <a:p>
             <a:fld id="{6B7A296C-764E-4169-9E16-58B9AF5DE7BA}" type="slidenum">
               <a:rPr lang="de-DE" smtClean="0"/>
-              <a:t>‹Nr.›</a:t>
+              <a:t>‹#›</a:t>
             </a:fld>
             <a:endParaRPr lang="de-DE"/>
           </a:p>
@@ -2707,7 +2707,7 @@
           <a:p>
             <a:fld id="{6B7A296C-764E-4169-9E16-58B9AF5DE7BA}" type="slidenum">
               <a:rPr lang="de-DE" smtClean="0"/>
-              <a:t>‹Nr.›</a:t>
+              <a:t>‹#›</a:t>
             </a:fld>
             <a:endParaRPr lang="de-DE"/>
           </a:p>
@@ -2820,7 +2820,7 @@
           <a:p>
             <a:fld id="{6B7A296C-764E-4169-9E16-58B9AF5DE7BA}" type="slidenum">
               <a:rPr lang="de-DE" smtClean="0"/>
-              <a:t>‹Nr.›</a:t>
+              <a:t>‹#›</a:t>
             </a:fld>
             <a:endParaRPr lang="de-DE"/>
           </a:p>
@@ -3131,7 +3131,7 @@
           <a:p>
             <a:fld id="{6B7A296C-764E-4169-9E16-58B9AF5DE7BA}" type="slidenum">
               <a:rPr lang="de-DE" smtClean="0"/>
-              <a:t>‹Nr.›</a:t>
+              <a:t>‹#›</a:t>
             </a:fld>
             <a:endParaRPr lang="de-DE"/>
           </a:p>
@@ -3419,7 +3419,7 @@
           <a:p>
             <a:fld id="{6B7A296C-764E-4169-9E16-58B9AF5DE7BA}" type="slidenum">
               <a:rPr lang="de-DE" smtClean="0"/>
-              <a:t>‹Nr.›</a:t>
+              <a:t>‹#›</a:t>
             </a:fld>
             <a:endParaRPr lang="de-DE"/>
           </a:p>
@@ -3696,7 +3696,7 @@
           <a:p>
             <a:fld id="{6B7A296C-764E-4169-9E16-58B9AF5DE7BA}" type="slidenum">
               <a:rPr lang="de-DE" smtClean="0"/>
-              <a:t>‹Nr.›</a:t>
+              <a:t>‹#›</a:t>
             </a:fld>
             <a:endParaRPr lang="de-DE"/>
           </a:p>
@@ -4009,6 +4009,14 @@
 <file path=ppt/slides/slide1.xml><?xml version="1.0" encoding="utf-8"?>
 <p:sld xmlns:a="http://schemas.openxmlformats.org/drawingml/2006/main" xmlns:r="http://schemas.openxmlformats.org/officeDocument/2006/relationships" xmlns:p="http://schemas.openxmlformats.org/presentationml/2006/main">
   <p:cSld>
+    <p:bg>
+      <p:bgPr>
+        <a:solidFill>
+          <a:schemeClr val="bg1"/>
+        </a:solidFill>
+        <a:effectLst/>
+      </p:bgPr>
+    </p:bg>
     <p:spTree>
       <p:nvGrpSpPr>
         <p:cNvPr id="1" name=""/>
@@ -4025,6 +4033,138 @@
       </p:grpSpPr>
       <p:sp>
         <p:nvSpPr>
+          <p:cNvPr id="8" name="tint">
+            <a:extLst>
+              <a:ext uri="{FF2B5EF4-FFF2-40B4-BE49-F238E27FC236}">
+                <a16:creationId xmlns:a16="http://schemas.microsoft.com/office/drawing/2014/main" id="{E227FAA5-3AEE-5FAC-A51F-1C5B562736E8}"/>
+              </a:ext>
+              <a:ext uri="{C183D7F6-B498-43B3-948B-1728B52AA6E4}">
+                <adec:decorative xmlns:adec="http://schemas.microsoft.com/office/drawing/2017/decorative" val="1"/>
+              </a:ext>
+            </a:extLst>
+          </p:cNvPr>
+          <p:cNvSpPr>
+            <a:spLocks noGrp="1" noRot="1" noChangeAspect="1" noMove="1" noResize="1" noEditPoints="1" noAdjustHandles="1" noChangeArrowheads="1" noChangeShapeType="1" noTextEdit="1"/>
+          </p:cNvSpPr>
+          <p:nvPr>
+            <p:extLst>
+              <p:ext uri="{386F3935-93C4-4BCD-93E2-E3B085C9AB24}">
+                <p16:designElem xmlns:p16="http://schemas.microsoft.com/office/powerpoint/2015/main" val="1"/>
+              </p:ext>
+            </p:extLst>
+          </p:nvPr>
+        </p:nvSpPr>
+        <p:spPr>
+          <a:xfrm>
+            <a:off x="-1117" y="0"/>
+            <a:ext cx="12193117" cy="6858000"/>
+          </a:xfrm>
+          <a:prstGeom prst="rect">
+            <a:avLst/>
+          </a:prstGeom>
+          <a:solidFill>
+            <a:schemeClr val="bg2">
+              <a:alpha val="40000"/>
+            </a:schemeClr>
+          </a:solidFill>
+          <a:ln>
+            <a:noFill/>
+          </a:ln>
+        </p:spPr>
+        <p:style>
+          <a:lnRef idx="2">
+            <a:schemeClr val="accent1">
+              <a:shade val="50000"/>
+            </a:schemeClr>
+          </a:lnRef>
+          <a:fillRef idx="1">
+            <a:schemeClr val="accent1"/>
+          </a:fillRef>
+          <a:effectRef idx="0">
+            <a:schemeClr val="accent1"/>
+          </a:effectRef>
+          <a:fontRef idx="minor">
+            <a:schemeClr val="lt1"/>
+          </a:fontRef>
+        </p:style>
+        <p:txBody>
+          <a:bodyPr rtlCol="0" anchor="ctr"/>
+          <a:lstStyle/>
+          <a:p>
+            <a:pPr algn="ctr"/>
+            <a:endParaRPr lang="en-US"/>
+          </a:p>
+        </p:txBody>
+      </p:sp>
+      <p:sp useBgFill="1">
+        <p:nvSpPr>
+          <p:cNvPr id="10" name="Rectangle 9">
+            <a:extLst>
+              <a:ext uri="{FF2B5EF4-FFF2-40B4-BE49-F238E27FC236}">
+                <a16:creationId xmlns:a16="http://schemas.microsoft.com/office/drawing/2014/main" id="{7755296F-825A-94F5-83F9-11CE0B008C6F}"/>
+              </a:ext>
+              <a:ext uri="{C183D7F6-B498-43B3-948B-1728B52AA6E4}">
+                <adec:decorative xmlns:adec="http://schemas.microsoft.com/office/drawing/2017/decorative" val="1"/>
+              </a:ext>
+            </a:extLst>
+          </p:cNvPr>
+          <p:cNvSpPr>
+            <a:spLocks noGrp="1" noRot="1" noChangeAspect="1" noMove="1" noResize="1" noEditPoints="1" noAdjustHandles="1" noChangeArrowheads="1" noChangeShapeType="1" noTextEdit="1"/>
+          </p:cNvSpPr>
+          <p:nvPr>
+            <p:extLst>
+              <p:ext uri="{386F3935-93C4-4BCD-93E2-E3B085C9AB24}">
+                <p16:designElem xmlns:p16="http://schemas.microsoft.com/office/powerpoint/2015/main" val="1"/>
+              </p:ext>
+            </p:extLst>
+          </p:nvPr>
+        </p:nvSpPr>
+        <p:spPr>
+          <a:xfrm>
+            <a:off x="-1116" y="8301"/>
+            <a:ext cx="12193116" cy="4570514"/>
+          </a:xfrm>
+          <a:prstGeom prst="rect">
+            <a:avLst/>
+          </a:prstGeom>
+          <a:ln>
+            <a:noFill/>
+          </a:ln>
+          <a:effectLst>
+            <a:outerShdw blurRad="228600" dist="152400" dir="5460000" sx="94000" sy="94000" algn="t" rotWithShape="0">
+              <a:srgbClr val="000000">
+                <a:alpha val="36000"/>
+              </a:srgbClr>
+            </a:outerShdw>
+          </a:effectLst>
+        </p:spPr>
+        <p:style>
+          <a:lnRef idx="2">
+            <a:schemeClr val="accent1">
+              <a:shade val="50000"/>
+            </a:schemeClr>
+          </a:lnRef>
+          <a:fillRef idx="1">
+            <a:schemeClr val="accent1"/>
+          </a:fillRef>
+          <a:effectRef idx="0">
+            <a:schemeClr val="accent1"/>
+          </a:effectRef>
+          <a:fontRef idx="minor">
+            <a:schemeClr val="lt1"/>
+          </a:fontRef>
+        </p:style>
+        <p:txBody>
+          <a:bodyPr rtlCol="0" anchor="ctr"/>
+          <a:lstStyle/>
+          <a:p>
+            <a:pPr algn="ctr"/>
+            <a:endParaRPr lang="en-US" dirty="0"/>
+          </a:p>
+        </p:txBody>
+      </p:sp>
+      <p:sp>
+        <p:nvSpPr>
           <p:cNvPr id="2" name="Titel 1">
             <a:extLst>
               <a:ext uri="{FF2B5EF4-FFF2-40B4-BE49-F238E27FC236}">
@@ -4039,15 +4179,30 @@
             <p:ph type="ctrTitle"/>
           </p:nvPr>
         </p:nvSpPr>
-        <p:spPr/>
-        <p:txBody>
-          <a:bodyPr/>
-          <a:lstStyle/>
-          <a:p>
-            <a:r>
-              <a:rPr lang="de-DE" dirty="0"/>
+        <p:spPr>
+          <a:xfrm>
+            <a:off x="768096" y="777240"/>
+            <a:ext cx="9753600" cy="2853210"/>
+          </a:xfrm>
+        </p:spPr>
+        <p:txBody>
+          <a:bodyPr anchor="t">
+            <a:normAutofit/>
+          </a:bodyPr>
+          <a:lstStyle/>
+          <a:p>
+            <a:pPr algn="l"/>
+            <a:r>
+              <a:rPr lang="de-DE" sz="5400" dirty="0"/>
               <a:t>KI Gruppenprojekt</a:t>
             </a:r>
+            <a:br>
+              <a:rPr lang="de-DE" sz="5400" dirty="0"/>
+            </a:br>
+            <a:r>
+              <a:rPr lang="de-DE" sz="5400" dirty="0"/>
+              <a:t>Bildanalyse</a:t>
+            </a:r>
           </a:p>
         </p:txBody>
       </p:sp>
@@ -4067,12 +4222,23 @@
             <p:ph type="subTitle" idx="1"/>
           </p:nvPr>
         </p:nvSpPr>
-        <p:spPr/>
-        <p:txBody>
-          <a:bodyPr/>
-          <a:lstStyle/>
-          <a:p>
-            <a:endParaRPr lang="de-DE"/>
+        <p:spPr>
+          <a:xfrm>
+            <a:off x="773430" y="5244554"/>
+            <a:ext cx="9753600" cy="947706"/>
+          </a:xfrm>
+        </p:spPr>
+        <p:txBody>
+          <a:bodyPr anchor="ctr">
+            <a:normAutofit/>
+          </a:bodyPr>
+          <a:lstStyle/>
+          <a:p>
+            <a:pPr algn="l"/>
+            <a:r>
+              <a:rPr lang="de-DE"/>
+              <a:t>Alina Saskia Simon, Jannes Bikker, Julian Schöpe, Malte Elvers, Marvin Stier</a:t>
+            </a:r>
           </a:p>
         </p:txBody>
       </p:sp>
@@ -4437,6 +4603,14 @@
 <file path=ppt/slides/slide2.xml><?xml version="1.0" encoding="utf-8"?>
 <p:sld xmlns:a="http://schemas.openxmlformats.org/drawingml/2006/main" xmlns:r="http://schemas.openxmlformats.org/officeDocument/2006/relationships" xmlns:p="http://schemas.openxmlformats.org/presentationml/2006/main">
   <p:cSld>
+    <p:bg>
+      <p:bgPr>
+        <a:solidFill>
+          <a:schemeClr val="bg1"/>
+        </a:solidFill>
+        <a:effectLst/>
+      </p:bgPr>
+    </p:bg>
     <p:spTree>
       <p:nvGrpSpPr>
         <p:cNvPr id="1" name=""/>
@@ -4451,74 +4625,63 @@
           <a:chExt cx="0" cy="0"/>
         </a:xfrm>
       </p:grpSpPr>
-      <p:sp>
-        <p:nvSpPr>
-          <p:cNvPr id="2" name="Titel 1">
-            <a:extLst>
-              <a:ext uri="{FF2B5EF4-FFF2-40B4-BE49-F238E27FC236}">
-                <a16:creationId xmlns:a16="http://schemas.microsoft.com/office/drawing/2014/main" id="{B41BD168-73FF-3D9A-1D40-FA76CAF93443}"/>
-              </a:ext>
-            </a:extLst>
-          </p:cNvPr>
-          <p:cNvSpPr>
-            <a:spLocks noGrp="1"/>
-          </p:cNvSpPr>
-          <p:nvPr>
-            <p:ph type="title"/>
-          </p:nvPr>
-        </p:nvSpPr>
-        <p:spPr/>
-        <p:txBody>
-          <a:bodyPr/>
-          <a:lstStyle/>
-          <a:p>
-            <a:r>
-              <a:rPr lang="de-DE" dirty="0"/>
-              <a:t>Erster Datensatz</a:t>
-            </a:r>
-          </a:p>
-        </p:txBody>
-      </p:sp>
-      <p:sp>
-        <p:nvSpPr>
-          <p:cNvPr id="3" name="Inhaltsplatzhalter 2">
-            <a:extLst>
-              <a:ext uri="{FF2B5EF4-FFF2-40B4-BE49-F238E27FC236}">
-                <a16:creationId xmlns:a16="http://schemas.microsoft.com/office/drawing/2014/main" id="{17AE079C-6AAE-32B7-559E-2D9BFE76B5DD}"/>
-              </a:ext>
-            </a:extLst>
-          </p:cNvPr>
-          <p:cNvSpPr>
-            <a:spLocks noGrp="1"/>
-          </p:cNvSpPr>
-          <p:nvPr>
-            <p:ph idx="1"/>
-          </p:nvPr>
-        </p:nvSpPr>
-        <p:spPr/>
-        <p:txBody>
-          <a:bodyPr/>
-          <a:lstStyle/>
-          <a:p>
-            <a:r>
-              <a:rPr lang="de-DE" dirty="0"/>
-              <a:t>Fruit Quality Dataset</a:t>
-            </a:r>
-          </a:p>
-          <a:p>
-            <a:r>
-              <a:rPr lang="de-DE" dirty="0"/>
-              <a:t>CNN Ansatz</a:t>
-            </a:r>
-          </a:p>
-          <a:p>
-            <a:endParaRPr lang="de-DE" dirty="0"/>
-          </a:p>
-          <a:p>
-            <a:r>
-              <a:rPr lang="de-DE" dirty="0"/>
-              <a:t>Fehlerhafte Labels</a:t>
-            </a:r>
+      <p:sp useBgFill="1">
+        <p:nvSpPr>
+          <p:cNvPr id="27" name="Slide Background">
+            <a:extLst>
+              <a:ext uri="{FF2B5EF4-FFF2-40B4-BE49-F238E27FC236}">
+                <a16:creationId xmlns:a16="http://schemas.microsoft.com/office/drawing/2014/main" id="{9F7D5CDA-D291-4307-BF55-1381FED29634}"/>
+              </a:ext>
+              <a:ext uri="{C183D7F6-B498-43B3-948B-1728B52AA6E4}">
+                <adec:decorative xmlns:adec="http://schemas.microsoft.com/office/drawing/2017/decorative" val="1"/>
+              </a:ext>
+            </a:extLst>
+          </p:cNvPr>
+          <p:cNvSpPr>
+            <a:spLocks noGrp="1" noRot="1" noChangeAspect="1" noMove="1" noResize="1" noEditPoints="1" noAdjustHandles="1" noChangeArrowheads="1" noChangeShapeType="1" noTextEdit="1"/>
+          </p:cNvSpPr>
+          <p:nvPr>
+            <p:extLst>
+              <p:ext uri="{386F3935-93C4-4BCD-93E2-E3B085C9AB24}">
+                <p16:designElem xmlns:p16="http://schemas.microsoft.com/office/powerpoint/2015/main" val="1"/>
+              </p:ext>
+            </p:extLst>
+          </p:nvPr>
+        </p:nvSpPr>
+        <p:spPr>
+          <a:xfrm>
+            <a:off x="0" y="0"/>
+            <a:ext cx="12192000" cy="6858000"/>
+          </a:xfrm>
+          <a:prstGeom prst="rect">
+            <a:avLst/>
+          </a:prstGeom>
+          <a:ln>
+            <a:noFill/>
+          </a:ln>
+        </p:spPr>
+        <p:style>
+          <a:lnRef idx="2">
+            <a:schemeClr val="accent1">
+              <a:shade val="50000"/>
+            </a:schemeClr>
+          </a:lnRef>
+          <a:fillRef idx="1">
+            <a:schemeClr val="accent1"/>
+          </a:fillRef>
+          <a:effectRef idx="0">
+            <a:schemeClr val="accent1"/>
+          </a:effectRef>
+          <a:fontRef idx="minor">
+            <a:schemeClr val="lt1"/>
+          </a:fontRef>
+        </p:style>
+        <p:txBody>
+          <a:bodyPr rtlCol="0" anchor="ctr"/>
+          <a:lstStyle/>
+          <a:p>
+            <a:pPr algn="ctr"/>
+            <a:endParaRPr lang="en-US"/>
           </a:p>
         </p:txBody>
       </p:sp>
@@ -4544,20 +4707,238 @@
               </a:ext>
             </a:extLst>
           </a:blip>
-          <a:stretch>
-            <a:fillRect/>
-          </a:stretch>
+          <a:srcRect l="6969" r="4245"/>
+          <a:stretch/>
         </p:blipFill>
         <p:spPr>
           <a:xfrm>
-            <a:off x="6514800" y="1337963"/>
-            <a:ext cx="4839000" cy="4839000"/>
+            <a:off x="6103027" y="10"/>
+            <a:ext cx="6088971" cy="6857990"/>
           </a:xfrm>
           <a:prstGeom prst="rect">
             <a:avLst/>
           </a:prstGeom>
         </p:spPr>
       </p:pic>
+      <p:sp useBgFill="1">
+        <p:nvSpPr>
+          <p:cNvPr id="28" name="Rectangle 27">
+            <a:extLst>
+              <a:ext uri="{FF2B5EF4-FFF2-40B4-BE49-F238E27FC236}">
+                <a16:creationId xmlns:a16="http://schemas.microsoft.com/office/drawing/2014/main" id="{59B296B9-C5A5-4E4F-9B60-C907B5F1466C}"/>
+              </a:ext>
+              <a:ext uri="{C183D7F6-B498-43B3-948B-1728B52AA6E4}">
+                <adec:decorative xmlns:adec="http://schemas.microsoft.com/office/drawing/2017/decorative" val="1"/>
+              </a:ext>
+            </a:extLst>
+          </p:cNvPr>
+          <p:cNvSpPr>
+            <a:spLocks noGrp="1" noRot="1" noChangeAspect="1" noMove="1" noResize="1" noEditPoints="1" noAdjustHandles="1" noChangeArrowheads="1" noChangeShapeType="1" noTextEdit="1"/>
+          </p:cNvSpPr>
+          <p:nvPr>
+            <p:extLst>
+              <p:ext uri="{386F3935-93C4-4BCD-93E2-E3B085C9AB24}">
+                <p16:designElem xmlns:p16="http://schemas.microsoft.com/office/powerpoint/2015/main" val="1"/>
+              </p:ext>
+            </p:extLst>
+          </p:nvPr>
+        </p:nvSpPr>
+        <p:spPr>
+          <a:xfrm>
+            <a:off x="0" y="0"/>
+            <a:ext cx="6103025" cy="6858000"/>
+          </a:xfrm>
+          <a:prstGeom prst="rect">
+            <a:avLst/>
+          </a:prstGeom>
+          <a:ln>
+            <a:noFill/>
+          </a:ln>
+          <a:effectLst>
+            <a:outerShdw blurRad="889000" dist="406400" dir="21540000" sx="90000" sy="90000" algn="t" rotWithShape="0">
+              <a:srgbClr val="000000">
+                <a:alpha val="20000"/>
+              </a:srgbClr>
+            </a:outerShdw>
+          </a:effectLst>
+        </p:spPr>
+        <p:style>
+          <a:lnRef idx="2">
+            <a:schemeClr val="accent1">
+              <a:shade val="50000"/>
+            </a:schemeClr>
+          </a:lnRef>
+          <a:fillRef idx="1">
+            <a:schemeClr val="accent1"/>
+          </a:fillRef>
+          <a:effectRef idx="0">
+            <a:schemeClr val="accent1"/>
+          </a:effectRef>
+          <a:fontRef idx="minor">
+            <a:schemeClr val="lt1"/>
+          </a:fontRef>
+        </p:style>
+        <p:txBody>
+          <a:bodyPr rtlCol="0" anchor="ctr"/>
+          <a:lstStyle/>
+          <a:p>
+            <a:pPr algn="ctr"/>
+            <a:endParaRPr lang="en-US"/>
+          </a:p>
+        </p:txBody>
+      </p:sp>
+      <p:sp useBgFill="1">
+        <p:nvSpPr>
+          <p:cNvPr id="26" name="Rectangle 25">
+            <a:extLst>
+              <a:ext uri="{FF2B5EF4-FFF2-40B4-BE49-F238E27FC236}">
+                <a16:creationId xmlns:a16="http://schemas.microsoft.com/office/drawing/2014/main" id="{D0300FD3-5AF1-6305-15FA-9078072672E2}"/>
+              </a:ext>
+              <a:ext uri="{C183D7F6-B498-43B3-948B-1728B52AA6E4}">
+                <adec:decorative xmlns:adec="http://schemas.microsoft.com/office/drawing/2017/decorative" val="1"/>
+              </a:ext>
+            </a:extLst>
+          </p:cNvPr>
+          <p:cNvSpPr>
+            <a:spLocks noGrp="1" noRot="1" noChangeAspect="1" noMove="1" noResize="1" noEditPoints="1" noAdjustHandles="1" noChangeArrowheads="1" noChangeShapeType="1" noTextEdit="1"/>
+          </p:cNvSpPr>
+          <p:nvPr>
+            <p:extLst>
+              <p:ext uri="{386F3935-93C4-4BCD-93E2-E3B085C9AB24}">
+                <p16:designElem xmlns:p16="http://schemas.microsoft.com/office/powerpoint/2015/main" val="1"/>
+              </p:ext>
+            </p:extLst>
+          </p:nvPr>
+        </p:nvSpPr>
+        <p:spPr>
+          <a:xfrm>
+            <a:off x="0" y="0"/>
+            <a:ext cx="6103025" cy="2285995"/>
+          </a:xfrm>
+          <a:prstGeom prst="rect">
+            <a:avLst/>
+          </a:prstGeom>
+          <a:ln>
+            <a:noFill/>
+          </a:ln>
+          <a:effectLst>
+            <a:outerShdw blurRad="254000" dist="127000" dir="5460000" sx="92000" sy="92000" algn="t" rotWithShape="0">
+              <a:srgbClr val="000000">
+                <a:alpha val="30000"/>
+              </a:srgbClr>
+            </a:outerShdw>
+          </a:effectLst>
+        </p:spPr>
+        <p:style>
+          <a:lnRef idx="2">
+            <a:schemeClr val="accent1">
+              <a:shade val="50000"/>
+            </a:schemeClr>
+          </a:lnRef>
+          <a:fillRef idx="1">
+            <a:schemeClr val="accent1"/>
+          </a:fillRef>
+          <a:effectRef idx="0">
+            <a:schemeClr val="accent1"/>
+          </a:effectRef>
+          <a:fontRef idx="minor">
+            <a:schemeClr val="lt1"/>
+          </a:fontRef>
+        </p:style>
+        <p:txBody>
+          <a:bodyPr rtlCol="0" anchor="ctr"/>
+          <a:lstStyle/>
+          <a:p>
+            <a:pPr algn="ctr"/>
+            <a:endParaRPr lang="en-US"/>
+          </a:p>
+        </p:txBody>
+      </p:sp>
+      <p:sp>
+        <p:nvSpPr>
+          <p:cNvPr id="2" name="Titel 1">
+            <a:extLst>
+              <a:ext uri="{FF2B5EF4-FFF2-40B4-BE49-F238E27FC236}">
+                <a16:creationId xmlns:a16="http://schemas.microsoft.com/office/drawing/2014/main" id="{B41BD168-73FF-3D9A-1D40-FA76CAF93443}"/>
+              </a:ext>
+            </a:extLst>
+          </p:cNvPr>
+          <p:cNvSpPr>
+            <a:spLocks noGrp="1"/>
+          </p:cNvSpPr>
+          <p:nvPr>
+            <p:ph type="title"/>
+          </p:nvPr>
+        </p:nvSpPr>
+        <p:spPr>
+          <a:xfrm>
+            <a:off x="761801" y="328512"/>
+            <a:ext cx="4778387" cy="1628970"/>
+          </a:xfrm>
+        </p:spPr>
+        <p:txBody>
+          <a:bodyPr anchor="ctr">
+            <a:normAutofit/>
+          </a:bodyPr>
+          <a:lstStyle/>
+          <a:p>
+            <a:r>
+              <a:rPr lang="de-DE" sz="4000"/>
+              <a:t>Erster Datensatz</a:t>
+            </a:r>
+          </a:p>
+        </p:txBody>
+      </p:sp>
+      <p:sp>
+        <p:nvSpPr>
+          <p:cNvPr id="3" name="Inhaltsplatzhalter 2">
+            <a:extLst>
+              <a:ext uri="{FF2B5EF4-FFF2-40B4-BE49-F238E27FC236}">
+                <a16:creationId xmlns:a16="http://schemas.microsoft.com/office/drawing/2014/main" id="{17AE079C-6AAE-32B7-559E-2D9BFE76B5DD}"/>
+              </a:ext>
+            </a:extLst>
+          </p:cNvPr>
+          <p:cNvSpPr>
+            <a:spLocks noGrp="1"/>
+          </p:cNvSpPr>
+          <p:nvPr>
+            <p:ph idx="1"/>
+          </p:nvPr>
+        </p:nvSpPr>
+        <p:spPr>
+          <a:xfrm>
+            <a:off x="761801" y="2884929"/>
+            <a:ext cx="4659756" cy="3374137"/>
+          </a:xfrm>
+        </p:spPr>
+        <p:txBody>
+          <a:bodyPr anchor="ctr">
+            <a:normAutofit/>
+          </a:bodyPr>
+          <a:lstStyle/>
+          <a:p>
+            <a:r>
+              <a:rPr lang="de-DE" sz="2000"/>
+              <a:t>Fruit Quality Dataset</a:t>
+            </a:r>
+          </a:p>
+          <a:p>
+            <a:r>
+              <a:rPr lang="de-DE" sz="2000"/>
+              <a:t>CNN Ansatz</a:t>
+            </a:r>
+          </a:p>
+          <a:p>
+            <a:endParaRPr lang="de-DE" sz="2000"/>
+          </a:p>
+          <a:p>
+            <a:r>
+              <a:rPr lang="de-DE" sz="2000"/>
+              <a:t>Fehlerhafte Labels</a:t>
+            </a:r>
+          </a:p>
+        </p:txBody>
+      </p:sp>
     </p:spTree>
     <p:extLst>
       <p:ext uri="{BB962C8B-B14F-4D97-AF65-F5344CB8AC3E}">
@@ -4574,6 +4955,14 @@
 <file path=ppt/slides/slide3.xml><?xml version="1.0" encoding="utf-8"?>
 <p:sld xmlns:a="http://schemas.openxmlformats.org/drawingml/2006/main" xmlns:r="http://schemas.openxmlformats.org/officeDocument/2006/relationships" xmlns:p="http://schemas.openxmlformats.org/presentationml/2006/main">
   <p:cSld>
+    <p:bg>
+      <p:bgPr>
+        <a:solidFill>
+          <a:schemeClr val="bg1"/>
+        </a:solidFill>
+        <a:effectLst/>
+      </p:bgPr>
+    </p:bg>
     <p:spTree>
       <p:nvGrpSpPr>
         <p:cNvPr id="1" name=""/>
@@ -4588,78 +4977,63 @@
           <a:chExt cx="0" cy="0"/>
         </a:xfrm>
       </p:grpSpPr>
-      <p:sp>
-        <p:nvSpPr>
-          <p:cNvPr id="2" name="Titel 1">
-            <a:extLst>
-              <a:ext uri="{FF2B5EF4-FFF2-40B4-BE49-F238E27FC236}">
-                <a16:creationId xmlns:a16="http://schemas.microsoft.com/office/drawing/2014/main" id="{B633F700-1021-EB9F-4D63-4FE58011ECEF}"/>
-              </a:ext>
-            </a:extLst>
-          </p:cNvPr>
-          <p:cNvSpPr>
-            <a:spLocks noGrp="1"/>
-          </p:cNvSpPr>
-          <p:nvPr>
-            <p:ph type="title"/>
-          </p:nvPr>
-        </p:nvSpPr>
-        <p:spPr/>
-        <p:txBody>
-          <a:bodyPr/>
-          <a:lstStyle/>
-          <a:p>
-            <a:r>
-              <a:rPr lang="de-DE" dirty="0"/>
-              <a:t>Neuer Datensatz + Ziel</a:t>
-            </a:r>
-          </a:p>
-        </p:txBody>
-      </p:sp>
-      <p:sp>
-        <p:nvSpPr>
-          <p:cNvPr id="3" name="Inhaltsplatzhalter 2">
-            <a:extLst>
-              <a:ext uri="{FF2B5EF4-FFF2-40B4-BE49-F238E27FC236}">
-                <a16:creationId xmlns:a16="http://schemas.microsoft.com/office/drawing/2014/main" id="{D6FBDAED-7B40-5CDE-3EF1-FD3DE306D4F2}"/>
-              </a:ext>
-            </a:extLst>
-          </p:cNvPr>
-          <p:cNvSpPr>
-            <a:spLocks noGrp="1"/>
-          </p:cNvSpPr>
-          <p:nvPr>
-            <p:ph idx="1"/>
-          </p:nvPr>
-        </p:nvSpPr>
-        <p:spPr/>
-        <p:txBody>
-          <a:bodyPr/>
-          <a:lstStyle/>
-          <a:p>
-            <a:r>
-              <a:rPr lang="de-DE" dirty="0"/>
-              <a:t>German Traffic </a:t>
-            </a:r>
-            <a:r>
-              <a:rPr lang="de-DE" dirty="0" err="1"/>
-              <a:t>Sign</a:t>
-            </a:r>
-            <a:r>
-              <a:rPr lang="de-DE" dirty="0"/>
-              <a:t> </a:t>
-            </a:r>
-            <a:r>
-              <a:rPr lang="de-DE" dirty="0" err="1"/>
-              <a:t>Detection</a:t>
-            </a:r>
-            <a:r>
-              <a:rPr lang="de-DE" dirty="0"/>
-              <a:t> Benchmark Datensatz</a:t>
-            </a:r>
-          </a:p>
-          <a:p>
-            <a:endParaRPr lang="de-DE" dirty="0"/>
+      <p:sp useBgFill="1">
+        <p:nvSpPr>
+          <p:cNvPr id="15" name="Slide Background">
+            <a:extLst>
+              <a:ext uri="{FF2B5EF4-FFF2-40B4-BE49-F238E27FC236}">
+                <a16:creationId xmlns:a16="http://schemas.microsoft.com/office/drawing/2014/main" id="{9F7D5CDA-D291-4307-BF55-1381FED29634}"/>
+              </a:ext>
+              <a:ext uri="{C183D7F6-B498-43B3-948B-1728B52AA6E4}">
+                <adec:decorative xmlns:adec="http://schemas.microsoft.com/office/drawing/2017/decorative" val="1"/>
+              </a:ext>
+            </a:extLst>
+          </p:cNvPr>
+          <p:cNvSpPr>
+            <a:spLocks noGrp="1" noRot="1" noChangeAspect="1" noMove="1" noResize="1" noEditPoints="1" noAdjustHandles="1" noChangeArrowheads="1" noChangeShapeType="1" noTextEdit="1"/>
+          </p:cNvSpPr>
+          <p:nvPr>
+            <p:extLst>
+              <p:ext uri="{386F3935-93C4-4BCD-93E2-E3B085C9AB24}">
+                <p16:designElem xmlns:p16="http://schemas.microsoft.com/office/powerpoint/2015/main" val="1"/>
+              </p:ext>
+            </p:extLst>
+          </p:nvPr>
+        </p:nvSpPr>
+        <p:spPr>
+          <a:xfrm>
+            <a:off x="0" y="0"/>
+            <a:ext cx="12192000" cy="6858000"/>
+          </a:xfrm>
+          <a:prstGeom prst="rect">
+            <a:avLst/>
+          </a:prstGeom>
+          <a:ln>
+            <a:noFill/>
+          </a:ln>
+        </p:spPr>
+        <p:style>
+          <a:lnRef idx="2">
+            <a:schemeClr val="accent1">
+              <a:shade val="50000"/>
+            </a:schemeClr>
+          </a:lnRef>
+          <a:fillRef idx="1">
+            <a:schemeClr val="accent1"/>
+          </a:fillRef>
+          <a:effectRef idx="0">
+            <a:schemeClr val="accent1"/>
+          </a:effectRef>
+          <a:fontRef idx="minor">
+            <a:schemeClr val="lt1"/>
+          </a:fontRef>
+        </p:style>
+        <p:txBody>
+          <a:bodyPr rtlCol="0" anchor="ctr"/>
+          <a:lstStyle/>
+          <a:p>
+            <a:pPr algn="ctr"/>
+            <a:endParaRPr lang="en-US"/>
           </a:p>
         </p:txBody>
       </p:sp>
@@ -4685,20 +5059,226 @@
               </a:ext>
             </a:extLst>
           </a:blip>
-          <a:stretch>
-            <a:fillRect/>
-          </a:stretch>
+          <a:srcRect l="26915" r="20924"/>
+          <a:stretch/>
         </p:blipFill>
         <p:spPr>
           <a:xfrm>
-            <a:off x="1169400" y="2416198"/>
-            <a:ext cx="6393300" cy="3760765"/>
+            <a:off x="6103027" y="10"/>
+            <a:ext cx="6088971" cy="6857990"/>
           </a:xfrm>
           <a:prstGeom prst="rect">
             <a:avLst/>
           </a:prstGeom>
         </p:spPr>
       </p:pic>
+      <p:sp useBgFill="1">
+        <p:nvSpPr>
+          <p:cNvPr id="16" name="Rectangle 15">
+            <a:extLst>
+              <a:ext uri="{FF2B5EF4-FFF2-40B4-BE49-F238E27FC236}">
+                <a16:creationId xmlns:a16="http://schemas.microsoft.com/office/drawing/2014/main" id="{59B296B9-C5A5-4E4F-9B60-C907B5F1466C}"/>
+              </a:ext>
+              <a:ext uri="{C183D7F6-B498-43B3-948B-1728B52AA6E4}">
+                <adec:decorative xmlns:adec="http://schemas.microsoft.com/office/drawing/2017/decorative" val="1"/>
+              </a:ext>
+            </a:extLst>
+          </p:cNvPr>
+          <p:cNvSpPr>
+            <a:spLocks noGrp="1" noRot="1" noChangeAspect="1" noMove="1" noResize="1" noEditPoints="1" noAdjustHandles="1" noChangeArrowheads="1" noChangeShapeType="1" noTextEdit="1"/>
+          </p:cNvSpPr>
+          <p:nvPr>
+            <p:extLst>
+              <p:ext uri="{386F3935-93C4-4BCD-93E2-E3B085C9AB24}">
+                <p16:designElem xmlns:p16="http://schemas.microsoft.com/office/powerpoint/2015/main" val="1"/>
+              </p:ext>
+            </p:extLst>
+          </p:nvPr>
+        </p:nvSpPr>
+        <p:spPr>
+          <a:xfrm>
+            <a:off x="0" y="0"/>
+            <a:ext cx="6103025" cy="6858000"/>
+          </a:xfrm>
+          <a:prstGeom prst="rect">
+            <a:avLst/>
+          </a:prstGeom>
+          <a:ln>
+            <a:noFill/>
+          </a:ln>
+          <a:effectLst>
+            <a:outerShdw blurRad="889000" dist="406400" dir="21540000" sx="90000" sy="90000" algn="t" rotWithShape="0">
+              <a:srgbClr val="000000">
+                <a:alpha val="20000"/>
+              </a:srgbClr>
+            </a:outerShdw>
+          </a:effectLst>
+        </p:spPr>
+        <p:style>
+          <a:lnRef idx="2">
+            <a:schemeClr val="accent1">
+              <a:shade val="50000"/>
+            </a:schemeClr>
+          </a:lnRef>
+          <a:fillRef idx="1">
+            <a:schemeClr val="accent1"/>
+          </a:fillRef>
+          <a:effectRef idx="0">
+            <a:schemeClr val="accent1"/>
+          </a:effectRef>
+          <a:fontRef idx="minor">
+            <a:schemeClr val="lt1"/>
+          </a:fontRef>
+        </p:style>
+        <p:txBody>
+          <a:bodyPr rtlCol="0" anchor="ctr"/>
+          <a:lstStyle/>
+          <a:p>
+            <a:pPr algn="ctr"/>
+            <a:endParaRPr lang="en-US"/>
+          </a:p>
+        </p:txBody>
+      </p:sp>
+      <p:sp useBgFill="1">
+        <p:nvSpPr>
+          <p:cNvPr id="14" name="Rectangle 13">
+            <a:extLst>
+              <a:ext uri="{FF2B5EF4-FFF2-40B4-BE49-F238E27FC236}">
+                <a16:creationId xmlns:a16="http://schemas.microsoft.com/office/drawing/2014/main" id="{D0300FD3-5AF1-6305-15FA-9078072672E2}"/>
+              </a:ext>
+              <a:ext uri="{C183D7F6-B498-43B3-948B-1728B52AA6E4}">
+                <adec:decorative xmlns:adec="http://schemas.microsoft.com/office/drawing/2017/decorative" val="1"/>
+              </a:ext>
+            </a:extLst>
+          </p:cNvPr>
+          <p:cNvSpPr>
+            <a:spLocks noGrp="1" noRot="1" noChangeAspect="1" noMove="1" noResize="1" noEditPoints="1" noAdjustHandles="1" noChangeArrowheads="1" noChangeShapeType="1" noTextEdit="1"/>
+          </p:cNvSpPr>
+          <p:nvPr>
+            <p:extLst>
+              <p:ext uri="{386F3935-93C4-4BCD-93E2-E3B085C9AB24}">
+                <p16:designElem xmlns:p16="http://schemas.microsoft.com/office/powerpoint/2015/main" val="1"/>
+              </p:ext>
+            </p:extLst>
+          </p:nvPr>
+        </p:nvSpPr>
+        <p:spPr>
+          <a:xfrm>
+            <a:off x="0" y="0"/>
+            <a:ext cx="6103025" cy="2285995"/>
+          </a:xfrm>
+          <a:prstGeom prst="rect">
+            <a:avLst/>
+          </a:prstGeom>
+          <a:ln>
+            <a:noFill/>
+          </a:ln>
+          <a:effectLst>
+            <a:outerShdw blurRad="254000" dist="127000" dir="5460000" sx="92000" sy="92000" algn="t" rotWithShape="0">
+              <a:srgbClr val="000000">
+                <a:alpha val="30000"/>
+              </a:srgbClr>
+            </a:outerShdw>
+          </a:effectLst>
+        </p:spPr>
+        <p:style>
+          <a:lnRef idx="2">
+            <a:schemeClr val="accent1">
+              <a:shade val="50000"/>
+            </a:schemeClr>
+          </a:lnRef>
+          <a:fillRef idx="1">
+            <a:schemeClr val="accent1"/>
+          </a:fillRef>
+          <a:effectRef idx="0">
+            <a:schemeClr val="accent1"/>
+          </a:effectRef>
+          <a:fontRef idx="minor">
+            <a:schemeClr val="lt1"/>
+          </a:fontRef>
+        </p:style>
+        <p:txBody>
+          <a:bodyPr rtlCol="0" anchor="ctr"/>
+          <a:lstStyle/>
+          <a:p>
+            <a:pPr algn="ctr"/>
+            <a:endParaRPr lang="en-US"/>
+          </a:p>
+        </p:txBody>
+      </p:sp>
+      <p:sp>
+        <p:nvSpPr>
+          <p:cNvPr id="2" name="Titel 1">
+            <a:extLst>
+              <a:ext uri="{FF2B5EF4-FFF2-40B4-BE49-F238E27FC236}">
+                <a16:creationId xmlns:a16="http://schemas.microsoft.com/office/drawing/2014/main" id="{B633F700-1021-EB9F-4D63-4FE58011ECEF}"/>
+              </a:ext>
+            </a:extLst>
+          </p:cNvPr>
+          <p:cNvSpPr>
+            <a:spLocks noGrp="1"/>
+          </p:cNvSpPr>
+          <p:nvPr>
+            <p:ph type="title"/>
+          </p:nvPr>
+        </p:nvSpPr>
+        <p:spPr>
+          <a:xfrm>
+            <a:off x="761801" y="328512"/>
+            <a:ext cx="4778387" cy="1628970"/>
+          </a:xfrm>
+        </p:spPr>
+        <p:txBody>
+          <a:bodyPr anchor="ctr">
+            <a:normAutofit/>
+          </a:bodyPr>
+          <a:lstStyle/>
+          <a:p>
+            <a:r>
+              <a:rPr lang="de-DE" sz="4000"/>
+              <a:t>Neuer Datensatz + Ziel</a:t>
+            </a:r>
+          </a:p>
+        </p:txBody>
+      </p:sp>
+      <p:sp>
+        <p:nvSpPr>
+          <p:cNvPr id="3" name="Inhaltsplatzhalter 2">
+            <a:extLst>
+              <a:ext uri="{FF2B5EF4-FFF2-40B4-BE49-F238E27FC236}">
+                <a16:creationId xmlns:a16="http://schemas.microsoft.com/office/drawing/2014/main" id="{D6FBDAED-7B40-5CDE-3EF1-FD3DE306D4F2}"/>
+              </a:ext>
+            </a:extLst>
+          </p:cNvPr>
+          <p:cNvSpPr>
+            <a:spLocks noGrp="1"/>
+          </p:cNvSpPr>
+          <p:nvPr>
+            <p:ph idx="1"/>
+          </p:nvPr>
+        </p:nvSpPr>
+        <p:spPr>
+          <a:xfrm>
+            <a:off x="761801" y="2884929"/>
+            <a:ext cx="4659756" cy="3374137"/>
+          </a:xfrm>
+        </p:spPr>
+        <p:txBody>
+          <a:bodyPr anchor="ctr">
+            <a:normAutofit/>
+          </a:bodyPr>
+          <a:lstStyle/>
+          <a:p>
+            <a:r>
+              <a:rPr lang="de-DE" sz="2000"/>
+              <a:t>German Traffic Sign Detection Benchmark Datensatz</a:t>
+            </a:r>
+          </a:p>
+          <a:p>
+            <a:endParaRPr lang="de-DE" sz="2000"/>
+          </a:p>
+        </p:txBody>
+      </p:sp>
     </p:spTree>
     <p:extLst>
       <p:ext uri="{BB962C8B-B14F-4D97-AF65-F5344CB8AC3E}">
@@ -4827,7 +5407,7 @@
           <a:p>
             <a:pPr algn="ctr"/>
             <a:r>
-              <a:rPr lang="en-US" sz="5200" kern="1200" dirty="0">
+              <a:rPr lang="en-US" sz="5200" kern="1200">
                 <a:solidFill>
                   <a:schemeClr val="tx1"/>
                 </a:solidFill>
@@ -4837,6 +5417,14 @@
               </a:rPr>
               <a:t>Data Distribution</a:t>
             </a:r>
+            <a:endParaRPr lang="en-US" sz="5200" kern="1200" dirty="0">
+              <a:solidFill>
+                <a:schemeClr val="tx1"/>
+              </a:solidFill>
+              <a:latin typeface="+mj-lt"/>
+              <a:ea typeface="+mj-ea"/>
+              <a:cs typeface="+mj-cs"/>
+            </a:endParaRPr>
           </a:p>
         </p:txBody>
       </p:sp>
@@ -5527,12 +6115,8 @@
           <a:lstStyle/>
           <a:p>
             <a:r>
-              <a:rPr lang="de-DE" dirty="0"/>
-              <a:t>CNN </a:t>
-            </a:r>
-            <a:r>
-              <a:rPr lang="de-DE" dirty="0" err="1"/>
-              <a:t>Lokalisator</a:t>
+              <a:rPr lang="de-DE"/>
+              <a:t>CNN Lokalisator</a:t>
             </a:r>
             <a:endParaRPr lang="de-DE" dirty="0"/>
           </a:p>
@@ -5562,110 +6146,78 @@
           <a:lstStyle/>
           <a:p>
             <a:r>
-              <a:rPr lang="de-DE" dirty="0" err="1"/>
-              <a:t>Bounding</a:t>
-            </a:r>
-            <a:r>
-              <a:rPr lang="de-DE" dirty="0"/>
-              <a:t>-Box-Regression</a:t>
+              <a:rPr lang="de-DE"/>
+              <a:t>Bounding-Box-Regression</a:t>
             </a:r>
           </a:p>
           <a:p>
             <a:pPr lvl="1"/>
             <a:r>
-              <a:rPr lang="de-DE" dirty="0"/>
+              <a:rPr lang="de-DE"/>
               <a:t>Allein problematisch, wählte Bildmitte, um MSE zu minimieren</a:t>
             </a:r>
           </a:p>
           <a:p>
             <a:pPr lvl="1"/>
             <a:r>
-              <a:rPr lang="de-DE" dirty="0"/>
-              <a:t>Optimiert Größe und Position der </a:t>
-            </a:r>
-            <a:r>
-              <a:rPr lang="de-DE" dirty="0" err="1"/>
-              <a:t>Bounding</a:t>
-            </a:r>
-            <a:r>
-              <a:rPr lang="de-DE" dirty="0"/>
-              <a:t> Box</a:t>
+              <a:rPr lang="de-DE"/>
+              <a:t>Optimiert Größe und Position der Bounding Box</a:t>
             </a:r>
           </a:p>
           <a:p>
             <a:pPr lvl="1"/>
             <a:r>
-              <a:rPr lang="de-DE" dirty="0"/>
+              <a:rPr lang="de-DE"/>
               <a:t>Bräuchte zusätzliche Merkmale, um sinnvolle Objekterkennung zu ermöglichen</a:t>
             </a:r>
           </a:p>
           <a:p>
             <a:r>
-              <a:rPr lang="de-DE" dirty="0"/>
+              <a:rPr lang="de-DE"/>
               <a:t>ResNet-50 (Feature-Extractor)</a:t>
             </a:r>
           </a:p>
           <a:p>
             <a:pPr lvl="1"/>
             <a:r>
-              <a:rPr lang="de-DE" dirty="0"/>
+              <a:rPr lang="de-DE"/>
               <a:t>Extrahiert Merkmale (z.B. Kanten, Muster, Strukturen)</a:t>
             </a:r>
           </a:p>
           <a:p>
             <a:pPr lvl="1"/>
             <a:r>
-              <a:rPr lang="de-DE" dirty="0"/>
+              <a:rPr lang="de-DE"/>
               <a:t>Vortrainiertes Modell, nutzbar für Transfer Learning</a:t>
             </a:r>
           </a:p>
           <a:p>
             <a:pPr lvl="1"/>
             <a:r>
-              <a:rPr lang="de-DE" dirty="0"/>
-              <a:t>Erzeugt Feature-</a:t>
-            </a:r>
-            <a:r>
-              <a:rPr lang="de-DE" dirty="0" err="1"/>
-              <a:t>Map</a:t>
-            </a:r>
-            <a:r>
-              <a:rPr lang="de-DE" dirty="0"/>
-              <a:t> für weitere Verarbeitung</a:t>
-            </a:r>
-          </a:p>
-          <a:p>
-            <a:r>
-              <a:rPr lang="de-DE" dirty="0"/>
-              <a:t>Region </a:t>
-            </a:r>
-            <a:r>
-              <a:rPr lang="de-DE" dirty="0" err="1"/>
-              <a:t>Proposal</a:t>
-            </a:r>
-            <a:r>
-              <a:rPr lang="de-DE" dirty="0"/>
-              <a:t> Network (RPN)</a:t>
+              <a:rPr lang="de-DE"/>
+              <a:t>Erzeugt Feature-Map für weitere Verarbeitung</a:t>
+            </a:r>
+          </a:p>
+          <a:p>
+            <a:r>
+              <a:rPr lang="de-DE"/>
+              <a:t>Region Proposal Network (RPN)</a:t>
             </a:r>
           </a:p>
           <a:p>
             <a:pPr lvl="1"/>
             <a:r>
-              <a:rPr lang="de-DE" dirty="0"/>
-              <a:t>Generiert Vorschläge für Objektregionen basierend auf der Feature-</a:t>
-            </a:r>
-            <a:r>
-              <a:rPr lang="de-DE" dirty="0" err="1"/>
-              <a:t>Map</a:t>
+              <a:rPr lang="de-DE"/>
+              <a:t>Generiert Vorschläge für Objektregionen basierend auf der Feature-Map</a:t>
+            </a:r>
+          </a:p>
+          <a:p>
+            <a:pPr lvl="1"/>
+            <a:r>
+              <a:rPr lang="de-DE"/>
+              <a:t>Redundante Vorschläge werden gefiltert</a:t>
             </a:r>
             <a:endParaRPr lang="de-DE" dirty="0"/>
-          </a:p>
-          <a:p>
-            <a:pPr lvl="1"/>
-            <a:r>
-              <a:rPr lang="de-DE" dirty="0"/>
-              <a:t>Redundante Vorschläge werden gefiltert</a:t>
-            </a:r>
           </a:p>
         </p:txBody>
       </p:sp>
@@ -5685,6 +6237,14 @@
 <file path=ppt/slides/slide8.xml><?xml version="1.0" encoding="utf-8"?>
 <p:sld xmlns:a="http://schemas.openxmlformats.org/drawingml/2006/main" xmlns:r="http://schemas.openxmlformats.org/officeDocument/2006/relationships" xmlns:p="http://schemas.openxmlformats.org/presentationml/2006/main">
   <p:cSld>
+    <p:bg>
+      <p:bgPr>
+        <a:solidFill>
+          <a:schemeClr val="bg1"/>
+        </a:solidFill>
+        <a:effectLst/>
+      </p:bgPr>
+    </p:bg>
     <p:spTree>
       <p:nvGrpSpPr>
         <p:cNvPr id="1" name=""/>
@@ -5699,103 +6259,63 @@
           <a:chExt cx="0" cy="0"/>
         </a:xfrm>
       </p:grpSpPr>
-      <p:sp>
-        <p:nvSpPr>
-          <p:cNvPr id="2" name="Titel 1">
-            <a:extLst>
-              <a:ext uri="{FF2B5EF4-FFF2-40B4-BE49-F238E27FC236}">
-                <a16:creationId xmlns:a16="http://schemas.microsoft.com/office/drawing/2014/main" id="{EB3286BC-347E-F5AB-CBF7-D74011C21FEA}"/>
-              </a:ext>
-            </a:extLst>
-          </p:cNvPr>
-          <p:cNvSpPr>
-            <a:spLocks noGrp="1"/>
-          </p:cNvSpPr>
-          <p:nvPr>
-            <p:ph type="title"/>
-          </p:nvPr>
-        </p:nvSpPr>
-        <p:spPr/>
-        <p:txBody>
-          <a:bodyPr/>
-          <a:lstStyle/>
-          <a:p>
-            <a:r>
-              <a:rPr lang="de-DE" dirty="0"/>
-              <a:t>CNN Recognition</a:t>
-            </a:r>
-          </a:p>
-        </p:txBody>
-      </p:sp>
-      <p:sp>
-        <p:nvSpPr>
-          <p:cNvPr id="3" name="Inhaltsplatzhalter 2">
-            <a:extLst>
-              <a:ext uri="{FF2B5EF4-FFF2-40B4-BE49-F238E27FC236}">
-                <a16:creationId xmlns:a16="http://schemas.microsoft.com/office/drawing/2014/main" id="{929D487A-C113-11D2-5F93-0961841E7048}"/>
-              </a:ext>
-            </a:extLst>
-          </p:cNvPr>
-          <p:cNvSpPr>
-            <a:spLocks noGrp="1"/>
-          </p:cNvSpPr>
-          <p:nvPr>
-            <p:ph idx="1"/>
-          </p:nvPr>
-        </p:nvSpPr>
-        <p:spPr>
-          <a:xfrm>
-            <a:off x="766200" y="1862899"/>
-            <a:ext cx="5415939" cy="4351338"/>
-          </a:xfrm>
-        </p:spPr>
-        <p:txBody>
-          <a:bodyPr/>
-          <a:lstStyle/>
-          <a:p>
-            <a:r>
-              <a:rPr lang="de-DE" dirty="0"/>
-              <a:t>Mehrere </a:t>
-            </a:r>
-            <a:r>
-              <a:rPr lang="de-DE" dirty="0" err="1"/>
-              <a:t>Convolutional</a:t>
-            </a:r>
-            <a:r>
-              <a:rPr lang="de-DE" dirty="0"/>
-              <a:t> Layers (Conv2D) </a:t>
-            </a:r>
-          </a:p>
-          <a:p>
-            <a:r>
-              <a:rPr lang="de-DE" dirty="0" err="1"/>
-              <a:t>ReLUAktivierung</a:t>
-            </a:r>
-            <a:r>
-              <a:rPr lang="de-DE" dirty="0"/>
-              <a:t> </a:t>
-            </a:r>
-          </a:p>
-          <a:p>
-            <a:r>
-              <a:rPr lang="de-DE" dirty="0"/>
-              <a:t>Kernel-Regularisierung zur Merkmalsextraktion</a:t>
-            </a:r>
-          </a:p>
-          <a:p>
-            <a:r>
-              <a:rPr lang="de-DE" dirty="0"/>
-              <a:t>Batch-Normalisierung</a:t>
-            </a:r>
-          </a:p>
-          <a:p>
-            <a:r>
-              <a:rPr lang="de-DE" dirty="0"/>
-              <a:t>Max-Pooling-Schichten</a:t>
-            </a:r>
-          </a:p>
-          <a:p>
-            <a:endParaRPr lang="de-DE" dirty="0"/>
+      <p:sp useBgFill="1">
+        <p:nvSpPr>
+          <p:cNvPr id="17" name="Slide Background">
+            <a:extLst>
+              <a:ext uri="{FF2B5EF4-FFF2-40B4-BE49-F238E27FC236}">
+                <a16:creationId xmlns:a16="http://schemas.microsoft.com/office/drawing/2014/main" id="{9F7D5CDA-D291-4307-BF55-1381FED29634}"/>
+              </a:ext>
+              <a:ext uri="{C183D7F6-B498-43B3-948B-1728B52AA6E4}">
+                <adec:decorative xmlns:adec="http://schemas.microsoft.com/office/drawing/2017/decorative" val="1"/>
+              </a:ext>
+            </a:extLst>
+          </p:cNvPr>
+          <p:cNvSpPr>
+            <a:spLocks noGrp="1" noRot="1" noChangeAspect="1" noMove="1" noResize="1" noEditPoints="1" noAdjustHandles="1" noChangeArrowheads="1" noChangeShapeType="1" noTextEdit="1"/>
+          </p:cNvSpPr>
+          <p:nvPr>
+            <p:extLst>
+              <p:ext uri="{386F3935-93C4-4BCD-93E2-E3B085C9AB24}">
+                <p16:designElem xmlns:p16="http://schemas.microsoft.com/office/powerpoint/2015/main" val="1"/>
+              </p:ext>
+            </p:extLst>
+          </p:nvPr>
+        </p:nvSpPr>
+        <p:spPr>
+          <a:xfrm>
+            <a:off x="0" y="0"/>
+            <a:ext cx="12192000" cy="6858000"/>
+          </a:xfrm>
+          <a:prstGeom prst="rect">
+            <a:avLst/>
+          </a:prstGeom>
+          <a:ln>
+            <a:noFill/>
+          </a:ln>
+        </p:spPr>
+        <p:style>
+          <a:lnRef idx="2">
+            <a:schemeClr val="accent1">
+              <a:shade val="50000"/>
+            </a:schemeClr>
+          </a:lnRef>
+          <a:fillRef idx="1">
+            <a:schemeClr val="accent1"/>
+          </a:fillRef>
+          <a:effectRef idx="0">
+            <a:schemeClr val="accent1"/>
+          </a:effectRef>
+          <a:fontRef idx="minor">
+            <a:schemeClr val="lt1"/>
+          </a:fontRef>
+        </p:style>
+        <p:txBody>
+          <a:bodyPr rtlCol="0" anchor="ctr"/>
+          <a:lstStyle/>
+          <a:p>
+            <a:pPr algn="ctr"/>
+            <a:endParaRPr lang="en-US"/>
           </a:p>
         </p:txBody>
       </p:sp>
@@ -5821,20 +6341,250 @@
               </a:ext>
             </a:extLst>
           </a:blip>
-          <a:stretch>
-            <a:fillRect/>
-          </a:stretch>
+          <a:srcRect l="1854" r="10473" b="-5"/>
+          <a:stretch/>
         </p:blipFill>
         <p:spPr>
           <a:xfrm>
-            <a:off x="6357600" y="1280961"/>
-            <a:ext cx="4996200" cy="4933276"/>
+            <a:off x="6103027" y="10"/>
+            <a:ext cx="6088971" cy="6857990"/>
           </a:xfrm>
           <a:prstGeom prst="rect">
             <a:avLst/>
           </a:prstGeom>
         </p:spPr>
       </p:pic>
+      <p:sp useBgFill="1">
+        <p:nvSpPr>
+          <p:cNvPr id="18" name="Rectangle 17">
+            <a:extLst>
+              <a:ext uri="{FF2B5EF4-FFF2-40B4-BE49-F238E27FC236}">
+                <a16:creationId xmlns:a16="http://schemas.microsoft.com/office/drawing/2014/main" id="{59B296B9-C5A5-4E4F-9B60-C907B5F1466C}"/>
+              </a:ext>
+              <a:ext uri="{C183D7F6-B498-43B3-948B-1728B52AA6E4}">
+                <adec:decorative xmlns:adec="http://schemas.microsoft.com/office/drawing/2017/decorative" val="1"/>
+              </a:ext>
+            </a:extLst>
+          </p:cNvPr>
+          <p:cNvSpPr>
+            <a:spLocks noGrp="1" noRot="1" noChangeAspect="1" noMove="1" noResize="1" noEditPoints="1" noAdjustHandles="1" noChangeArrowheads="1" noChangeShapeType="1" noTextEdit="1"/>
+          </p:cNvSpPr>
+          <p:nvPr>
+            <p:extLst>
+              <p:ext uri="{386F3935-93C4-4BCD-93E2-E3B085C9AB24}">
+                <p16:designElem xmlns:p16="http://schemas.microsoft.com/office/powerpoint/2015/main" val="1"/>
+              </p:ext>
+            </p:extLst>
+          </p:nvPr>
+        </p:nvSpPr>
+        <p:spPr>
+          <a:xfrm>
+            <a:off x="0" y="0"/>
+            <a:ext cx="6103025" cy="6858000"/>
+          </a:xfrm>
+          <a:prstGeom prst="rect">
+            <a:avLst/>
+          </a:prstGeom>
+          <a:ln>
+            <a:noFill/>
+          </a:ln>
+          <a:effectLst>
+            <a:outerShdw blurRad="889000" dist="406400" dir="21540000" sx="90000" sy="90000" algn="t" rotWithShape="0">
+              <a:srgbClr val="000000">
+                <a:alpha val="20000"/>
+              </a:srgbClr>
+            </a:outerShdw>
+          </a:effectLst>
+        </p:spPr>
+        <p:style>
+          <a:lnRef idx="2">
+            <a:schemeClr val="accent1">
+              <a:shade val="50000"/>
+            </a:schemeClr>
+          </a:lnRef>
+          <a:fillRef idx="1">
+            <a:schemeClr val="accent1"/>
+          </a:fillRef>
+          <a:effectRef idx="0">
+            <a:schemeClr val="accent1"/>
+          </a:effectRef>
+          <a:fontRef idx="minor">
+            <a:schemeClr val="lt1"/>
+          </a:fontRef>
+        </p:style>
+        <p:txBody>
+          <a:bodyPr rtlCol="0" anchor="ctr"/>
+          <a:lstStyle/>
+          <a:p>
+            <a:pPr algn="ctr"/>
+            <a:endParaRPr lang="en-US"/>
+          </a:p>
+        </p:txBody>
+      </p:sp>
+      <p:sp useBgFill="1">
+        <p:nvSpPr>
+          <p:cNvPr id="16" name="Rectangle 15">
+            <a:extLst>
+              <a:ext uri="{FF2B5EF4-FFF2-40B4-BE49-F238E27FC236}">
+                <a16:creationId xmlns:a16="http://schemas.microsoft.com/office/drawing/2014/main" id="{D0300FD3-5AF1-6305-15FA-9078072672E2}"/>
+              </a:ext>
+              <a:ext uri="{C183D7F6-B498-43B3-948B-1728B52AA6E4}">
+                <adec:decorative xmlns:adec="http://schemas.microsoft.com/office/drawing/2017/decorative" val="1"/>
+              </a:ext>
+            </a:extLst>
+          </p:cNvPr>
+          <p:cNvSpPr>
+            <a:spLocks noGrp="1" noRot="1" noChangeAspect="1" noMove="1" noResize="1" noEditPoints="1" noAdjustHandles="1" noChangeArrowheads="1" noChangeShapeType="1" noTextEdit="1"/>
+          </p:cNvSpPr>
+          <p:nvPr>
+            <p:extLst>
+              <p:ext uri="{386F3935-93C4-4BCD-93E2-E3B085C9AB24}">
+                <p16:designElem xmlns:p16="http://schemas.microsoft.com/office/powerpoint/2015/main" val="1"/>
+              </p:ext>
+            </p:extLst>
+          </p:nvPr>
+        </p:nvSpPr>
+        <p:spPr>
+          <a:xfrm>
+            <a:off x="0" y="0"/>
+            <a:ext cx="6103025" cy="2285995"/>
+          </a:xfrm>
+          <a:prstGeom prst="rect">
+            <a:avLst/>
+          </a:prstGeom>
+          <a:ln>
+            <a:noFill/>
+          </a:ln>
+          <a:effectLst>
+            <a:outerShdw blurRad="254000" dist="127000" dir="5460000" sx="92000" sy="92000" algn="t" rotWithShape="0">
+              <a:srgbClr val="000000">
+                <a:alpha val="30000"/>
+              </a:srgbClr>
+            </a:outerShdw>
+          </a:effectLst>
+        </p:spPr>
+        <p:style>
+          <a:lnRef idx="2">
+            <a:schemeClr val="accent1">
+              <a:shade val="50000"/>
+            </a:schemeClr>
+          </a:lnRef>
+          <a:fillRef idx="1">
+            <a:schemeClr val="accent1"/>
+          </a:fillRef>
+          <a:effectRef idx="0">
+            <a:schemeClr val="accent1"/>
+          </a:effectRef>
+          <a:fontRef idx="minor">
+            <a:schemeClr val="lt1"/>
+          </a:fontRef>
+        </p:style>
+        <p:txBody>
+          <a:bodyPr rtlCol="0" anchor="ctr"/>
+          <a:lstStyle/>
+          <a:p>
+            <a:pPr algn="ctr"/>
+            <a:endParaRPr lang="en-US"/>
+          </a:p>
+        </p:txBody>
+      </p:sp>
+      <p:sp>
+        <p:nvSpPr>
+          <p:cNvPr id="2" name="Titel 1">
+            <a:extLst>
+              <a:ext uri="{FF2B5EF4-FFF2-40B4-BE49-F238E27FC236}">
+                <a16:creationId xmlns:a16="http://schemas.microsoft.com/office/drawing/2014/main" id="{EB3286BC-347E-F5AB-CBF7-D74011C21FEA}"/>
+              </a:ext>
+            </a:extLst>
+          </p:cNvPr>
+          <p:cNvSpPr>
+            <a:spLocks noGrp="1"/>
+          </p:cNvSpPr>
+          <p:nvPr>
+            <p:ph type="title"/>
+          </p:nvPr>
+        </p:nvSpPr>
+        <p:spPr>
+          <a:xfrm>
+            <a:off x="761801" y="328512"/>
+            <a:ext cx="4778387" cy="1628970"/>
+          </a:xfrm>
+        </p:spPr>
+        <p:txBody>
+          <a:bodyPr anchor="ctr">
+            <a:normAutofit/>
+          </a:bodyPr>
+          <a:lstStyle/>
+          <a:p>
+            <a:r>
+              <a:rPr lang="de-DE" sz="4000"/>
+              <a:t>CNN Recognition</a:t>
+            </a:r>
+          </a:p>
+        </p:txBody>
+      </p:sp>
+      <p:sp>
+        <p:nvSpPr>
+          <p:cNvPr id="3" name="Inhaltsplatzhalter 2">
+            <a:extLst>
+              <a:ext uri="{FF2B5EF4-FFF2-40B4-BE49-F238E27FC236}">
+                <a16:creationId xmlns:a16="http://schemas.microsoft.com/office/drawing/2014/main" id="{929D487A-C113-11D2-5F93-0961841E7048}"/>
+              </a:ext>
+            </a:extLst>
+          </p:cNvPr>
+          <p:cNvSpPr>
+            <a:spLocks noGrp="1"/>
+          </p:cNvSpPr>
+          <p:nvPr>
+            <p:ph idx="1"/>
+          </p:nvPr>
+        </p:nvSpPr>
+        <p:spPr>
+          <a:xfrm>
+            <a:off x="761801" y="2884929"/>
+            <a:ext cx="4659756" cy="3374137"/>
+          </a:xfrm>
+        </p:spPr>
+        <p:txBody>
+          <a:bodyPr anchor="ctr">
+            <a:normAutofit/>
+          </a:bodyPr>
+          <a:lstStyle/>
+          <a:p>
+            <a:r>
+              <a:rPr lang="de-DE" sz="2000"/>
+              <a:t>Mehrere Convolutional Layers (Conv2D) </a:t>
+            </a:r>
+          </a:p>
+          <a:p>
+            <a:r>
+              <a:rPr lang="de-DE" sz="2000"/>
+              <a:t>ReLUAktivierung </a:t>
+            </a:r>
+          </a:p>
+          <a:p>
+            <a:r>
+              <a:rPr lang="de-DE" sz="2000"/>
+              <a:t>Kernel-Regularisierung zur Merkmalsextraktion</a:t>
+            </a:r>
+          </a:p>
+          <a:p>
+            <a:r>
+              <a:rPr lang="de-DE" sz="2000"/>
+              <a:t>Batch-Normalisierung</a:t>
+            </a:r>
+          </a:p>
+          <a:p>
+            <a:r>
+              <a:rPr lang="de-DE" sz="2000"/>
+              <a:t>Max-Pooling-Schichten</a:t>
+            </a:r>
+          </a:p>
+          <a:p>
+            <a:endParaRPr lang="de-DE" sz="2000"/>
+          </a:p>
+        </p:txBody>
+      </p:sp>
     </p:spTree>
     <p:extLst>
       <p:ext uri="{BB962C8B-B14F-4D97-AF65-F5344CB8AC3E}">

</xml_diff>